<commit_message>
Recitation #3 slides 9/27/19 hash tables: added reference
</commit_message>
<xml_diff>
--- a/cs1501_rec3_Sept27.pptx
+++ b/cs1501_rec3_Sept27.pptx
@@ -3540,7 +3540,7 @@
           <p:cNvPr id="2" name="TextBox 1">
             <a:extLst>
               <a:ext uri="{FF2B5EF4-FFF2-40B4-BE49-F238E27FC236}">
-                <a16:creationId xmlns:a16="http://schemas.microsoft.com/office/drawing/2014/main" xmlns="" id="{FE5183E5-4E46-4A2A-A62B-50E981980D7B}"/>
+                <a16:creationId xmlns="" xmlns:a16="http://schemas.microsoft.com/office/drawing/2014/main" id="{FE5183E5-4E46-4A2A-A62B-50E981980D7B}"/>
               </a:ext>
             </a:extLst>
           </p:cNvPr>
@@ -3549,8 +3549,8 @@
         </p:nvSpPr>
         <p:spPr>
           <a:xfrm>
-            <a:off x="0" y="6155366"/>
-            <a:ext cx="8809464" cy="738664"/>
+            <a:off x="0" y="5903893"/>
+            <a:ext cx="9144000" cy="954107"/>
           </a:xfrm>
           <a:prstGeom prst="rect">
             <a:avLst/>
@@ -3601,7 +3601,39 @@
             </a:r>
             <a:r>
               <a:rPr lang="en-US" sz="1400" u="sng" dirty="0"/>
-              <a:t>, https://algs4.cs.princeton.edu/34hash/LinearProbingHashST.java</a:t>
+              <a:t>, </a:t>
+            </a:r>
+            <a:r>
+              <a:rPr lang="en-US" sz="1400" u="sng" dirty="0">
+                <a:hlinkClick r:id="rId5"/>
+              </a:rPr>
+              <a:t>https://</a:t>
+            </a:r>
+            <a:r>
+              <a:rPr lang="en-US" sz="1400" u="sng" dirty="0" smtClean="0">
+                <a:hlinkClick r:id="rId5"/>
+              </a:rPr>
+              <a:t>algs4.cs.princeton.edu/34hash/LinearProbingHashST.java</a:t>
+            </a:r>
+            <a:r>
+              <a:rPr lang="en-US" sz="1400" u="sng" dirty="0" smtClean="0">
+                <a:hlinkClick r:id="rId5"/>
+              </a:rPr>
+              <a:t>,</a:t>
+            </a:r>
+          </a:p>
+          <a:p>
+            <a:r>
+              <a:rPr lang="en-US" sz="1400" u="sng" dirty="0" smtClean="0">
+                <a:hlinkClick r:id="rId5"/>
+              </a:rPr>
+              <a:t>https</a:t>
+            </a:r>
+            <a:r>
+              <a:rPr lang="en-US" sz="1400" u="sng" dirty="0">
+                <a:hlinkClick r:id="rId5"/>
+              </a:rPr>
+              <a:t>://algs4.cs.princeton.edu/lectures/34HashTables.pdf</a:t>
             </a:r>
             <a:endParaRPr lang="en-US" sz="1400" u="sng" dirty="0"/>
           </a:p>
@@ -3649,7 +3681,7 @@
           <p:cNvPr id="11" name="TextBox 10">
             <a:extLst>
               <a:ext uri="{FF2B5EF4-FFF2-40B4-BE49-F238E27FC236}">
-                <a16:creationId xmlns:a16="http://schemas.microsoft.com/office/drawing/2014/main" xmlns="" id="{EABA38DD-3BDD-4C4E-A19E-1FC23A7B9798}"/>
+                <a16:creationId xmlns="" xmlns:a16="http://schemas.microsoft.com/office/drawing/2014/main" id="{EABA38DD-3BDD-4C4E-A19E-1FC23A7B9798}"/>
               </a:ext>
             </a:extLst>
           </p:cNvPr>
@@ -3687,7 +3719,7 @@
           <p:cNvPr id="13" name="TextBox 12">
             <a:extLst>
               <a:ext uri="{FF2B5EF4-FFF2-40B4-BE49-F238E27FC236}">
-                <a16:creationId xmlns:a16="http://schemas.microsoft.com/office/drawing/2014/main" xmlns="" id="{9D221932-FA0A-4E9F-8809-1558A9A80A29}"/>
+                <a16:creationId xmlns="" xmlns:a16="http://schemas.microsoft.com/office/drawing/2014/main" id="{9D221932-FA0A-4E9F-8809-1558A9A80A29}"/>
               </a:ext>
             </a:extLst>
           </p:cNvPr>
@@ -3777,7 +3809,7 @@
           <p:cNvPr id="3" name="Picture 2" descr="C:\Users\Karin\Google Drive\CS\CS1501\DoubleHashST.java - Notepad++">
             <a:extLst>
               <a:ext uri="{FF2B5EF4-FFF2-40B4-BE49-F238E27FC236}">
-                <a16:creationId xmlns:a16="http://schemas.microsoft.com/office/drawing/2014/main" xmlns="" id="{16C7A5C6-54FD-41F3-9DD2-B76AFDEE4435}"/>
+                <a16:creationId xmlns="" xmlns:a16="http://schemas.microsoft.com/office/drawing/2014/main" id="{16C7A5C6-54FD-41F3-9DD2-B76AFDEE4435}"/>
               </a:ext>
             </a:extLst>
           </p:cNvPr>
@@ -3849,7 +3881,7 @@
           <p:cNvPr id="11" name="TextBox 10">
             <a:extLst>
               <a:ext uri="{FF2B5EF4-FFF2-40B4-BE49-F238E27FC236}">
-                <a16:creationId xmlns:a16="http://schemas.microsoft.com/office/drawing/2014/main" xmlns="" id="{EABA38DD-3BDD-4C4E-A19E-1FC23A7B9798}"/>
+                <a16:creationId xmlns="" xmlns:a16="http://schemas.microsoft.com/office/drawing/2014/main" id="{EABA38DD-3BDD-4C4E-A19E-1FC23A7B9798}"/>
               </a:ext>
             </a:extLst>
           </p:cNvPr>
@@ -3887,7 +3919,7 @@
           <p:cNvPr id="13" name="TextBox 12">
             <a:extLst>
               <a:ext uri="{FF2B5EF4-FFF2-40B4-BE49-F238E27FC236}">
-                <a16:creationId xmlns:a16="http://schemas.microsoft.com/office/drawing/2014/main" xmlns="" id="{9D221932-FA0A-4E9F-8809-1558A9A80A29}"/>
+                <a16:creationId xmlns="" xmlns:a16="http://schemas.microsoft.com/office/drawing/2014/main" id="{9D221932-FA0A-4E9F-8809-1558A9A80A29}"/>
               </a:ext>
             </a:extLst>
           </p:cNvPr>
@@ -3983,7 +4015,7 @@
           <p:cNvPr id="4" name="Picture 3" descr="C:\Users\Karin\Google Drive\CS\CS1501\LinearProbingHashST.java - Notepad++">
             <a:extLst>
               <a:ext uri="{FF2B5EF4-FFF2-40B4-BE49-F238E27FC236}">
-                <a16:creationId xmlns:a16="http://schemas.microsoft.com/office/drawing/2014/main" xmlns="" id="{52F602DC-0E13-46DD-8FE9-77FAAD0B51A1}"/>
+                <a16:creationId xmlns="" xmlns:a16="http://schemas.microsoft.com/office/drawing/2014/main" id="{52F602DC-0E13-46DD-8FE9-77FAAD0B51A1}"/>
               </a:ext>
             </a:extLst>
           </p:cNvPr>
@@ -4055,7 +4087,7 @@
           <p:cNvPr id="11" name="TextBox 10">
             <a:extLst>
               <a:ext uri="{FF2B5EF4-FFF2-40B4-BE49-F238E27FC236}">
-                <a16:creationId xmlns:a16="http://schemas.microsoft.com/office/drawing/2014/main" xmlns="" id="{EABA38DD-3BDD-4C4E-A19E-1FC23A7B9798}"/>
+                <a16:creationId xmlns="" xmlns:a16="http://schemas.microsoft.com/office/drawing/2014/main" id="{EABA38DD-3BDD-4C4E-A19E-1FC23A7B9798}"/>
               </a:ext>
             </a:extLst>
           </p:cNvPr>
@@ -4093,7 +4125,7 @@
           <p:cNvPr id="5" name="TextBox 4">
             <a:extLst>
               <a:ext uri="{FF2B5EF4-FFF2-40B4-BE49-F238E27FC236}">
-                <a16:creationId xmlns:a16="http://schemas.microsoft.com/office/drawing/2014/main" xmlns="" id="{EEBDAD92-958F-46FF-A5D5-A1399CFF180E}"/>
+                <a16:creationId xmlns="" xmlns:a16="http://schemas.microsoft.com/office/drawing/2014/main" id="{EEBDAD92-958F-46FF-A5D5-A1399CFF180E}"/>
               </a:ext>
             </a:extLst>
           </p:cNvPr>
@@ -4192,7 +4224,7 @@
           <p:cNvPr id="4" name="Picture 3" descr="C:\Users\Karin\Google Drive\CS\CS1501\LinearProbingHashST.java - Notepad++">
             <a:extLst>
               <a:ext uri="{FF2B5EF4-FFF2-40B4-BE49-F238E27FC236}">
-                <a16:creationId xmlns:a16="http://schemas.microsoft.com/office/drawing/2014/main" xmlns="" id="{D69BC6EA-706C-4DC8-9369-D8B02D79084F}"/>
+                <a16:creationId xmlns="" xmlns:a16="http://schemas.microsoft.com/office/drawing/2014/main" id="{D69BC6EA-706C-4DC8-9369-D8B02D79084F}"/>
               </a:ext>
             </a:extLst>
           </p:cNvPr>
@@ -4264,7 +4296,7 @@
           <p:cNvPr id="11" name="TextBox 10">
             <a:extLst>
               <a:ext uri="{FF2B5EF4-FFF2-40B4-BE49-F238E27FC236}">
-                <a16:creationId xmlns:a16="http://schemas.microsoft.com/office/drawing/2014/main" xmlns="" id="{EABA38DD-3BDD-4C4E-A19E-1FC23A7B9798}"/>
+                <a16:creationId xmlns="" xmlns:a16="http://schemas.microsoft.com/office/drawing/2014/main" id="{EABA38DD-3BDD-4C4E-A19E-1FC23A7B9798}"/>
               </a:ext>
             </a:extLst>
           </p:cNvPr>
@@ -4302,7 +4334,7 @@
           <p:cNvPr id="5" name="TextBox 4">
             <a:extLst>
               <a:ext uri="{FF2B5EF4-FFF2-40B4-BE49-F238E27FC236}">
-                <a16:creationId xmlns:a16="http://schemas.microsoft.com/office/drawing/2014/main" xmlns="" id="{EEBDAD92-958F-46FF-A5D5-A1399CFF180E}"/>
+                <a16:creationId xmlns="" xmlns:a16="http://schemas.microsoft.com/office/drawing/2014/main" id="{EEBDAD92-958F-46FF-A5D5-A1399CFF180E}"/>
               </a:ext>
             </a:extLst>
           </p:cNvPr>
@@ -4401,7 +4433,7 @@
           <p:cNvPr id="4" name="Picture 3" descr="C:\Users\Karin\Google Drive\CS\CS1501\LinearProbingHashST.java - Notepad++">
             <a:extLst>
               <a:ext uri="{FF2B5EF4-FFF2-40B4-BE49-F238E27FC236}">
-                <a16:creationId xmlns:a16="http://schemas.microsoft.com/office/drawing/2014/main" xmlns="" id="{D69BC6EA-706C-4DC8-9369-D8B02D79084F}"/>
+                <a16:creationId xmlns="" xmlns:a16="http://schemas.microsoft.com/office/drawing/2014/main" id="{D69BC6EA-706C-4DC8-9369-D8B02D79084F}"/>
               </a:ext>
             </a:extLst>
           </p:cNvPr>
@@ -4473,7 +4505,7 @@
           <p:cNvPr id="11" name="TextBox 10">
             <a:extLst>
               <a:ext uri="{FF2B5EF4-FFF2-40B4-BE49-F238E27FC236}">
-                <a16:creationId xmlns:a16="http://schemas.microsoft.com/office/drawing/2014/main" xmlns="" id="{EABA38DD-3BDD-4C4E-A19E-1FC23A7B9798}"/>
+                <a16:creationId xmlns="" xmlns:a16="http://schemas.microsoft.com/office/drawing/2014/main" id="{EABA38DD-3BDD-4C4E-A19E-1FC23A7B9798}"/>
               </a:ext>
             </a:extLst>
           </p:cNvPr>
@@ -4511,7 +4543,7 @@
           <p:cNvPr id="5" name="TextBox 4">
             <a:extLst>
               <a:ext uri="{FF2B5EF4-FFF2-40B4-BE49-F238E27FC236}">
-                <a16:creationId xmlns:a16="http://schemas.microsoft.com/office/drawing/2014/main" xmlns="" id="{EEBDAD92-958F-46FF-A5D5-A1399CFF180E}"/>
+                <a16:creationId xmlns="" xmlns:a16="http://schemas.microsoft.com/office/drawing/2014/main" id="{EEBDAD92-958F-46FF-A5D5-A1399CFF180E}"/>
               </a:ext>
             </a:extLst>
           </p:cNvPr>
@@ -4593,7 +4625,7 @@
           <p:cNvPr id="3" name="Picture 2" descr="C:\Users\Karin\Google Drive\CS\CS1501\LinearProbingHashST_cut_top.java - Notepad++">
             <a:extLst>
               <a:ext uri="{FF2B5EF4-FFF2-40B4-BE49-F238E27FC236}">
-                <a16:creationId xmlns:a16="http://schemas.microsoft.com/office/drawing/2014/main" xmlns="" id="{703F0459-82BC-4FBF-8D7B-B492C0FCC232}"/>
+                <a16:creationId xmlns="" xmlns:a16="http://schemas.microsoft.com/office/drawing/2014/main" id="{703F0459-82BC-4FBF-8D7B-B492C0FCC232}"/>
               </a:ext>
             </a:extLst>
           </p:cNvPr>
@@ -4665,7 +4697,7 @@
           <p:cNvPr id="11" name="TextBox 10">
             <a:extLst>
               <a:ext uri="{FF2B5EF4-FFF2-40B4-BE49-F238E27FC236}">
-                <a16:creationId xmlns:a16="http://schemas.microsoft.com/office/drawing/2014/main" xmlns="" id="{EABA38DD-3BDD-4C4E-A19E-1FC23A7B9798}"/>
+                <a16:creationId xmlns="" xmlns:a16="http://schemas.microsoft.com/office/drawing/2014/main" id="{EABA38DD-3BDD-4C4E-A19E-1FC23A7B9798}"/>
               </a:ext>
             </a:extLst>
           </p:cNvPr>
@@ -4703,7 +4735,7 @@
           <p:cNvPr id="5" name="TextBox 4">
             <a:extLst>
               <a:ext uri="{FF2B5EF4-FFF2-40B4-BE49-F238E27FC236}">
-                <a16:creationId xmlns:a16="http://schemas.microsoft.com/office/drawing/2014/main" xmlns="" id="{EEBDAD92-958F-46FF-A5D5-A1399CFF180E}"/>
+                <a16:creationId xmlns="" xmlns:a16="http://schemas.microsoft.com/office/drawing/2014/main" id="{EEBDAD92-958F-46FF-A5D5-A1399CFF180E}"/>
               </a:ext>
             </a:extLst>
           </p:cNvPr>
@@ -4785,7 +4817,7 @@
           <p:cNvPr id="3" name="Picture 2" descr="C:\Users\Karin\Google Drive\CS\CS1501\LinearProbingHashST_cut_top.java - Notepad++">
             <a:extLst>
               <a:ext uri="{FF2B5EF4-FFF2-40B4-BE49-F238E27FC236}">
-                <a16:creationId xmlns:a16="http://schemas.microsoft.com/office/drawing/2014/main" xmlns="" id="{703F0459-82BC-4FBF-8D7B-B492C0FCC232}"/>
+                <a16:creationId xmlns="" xmlns:a16="http://schemas.microsoft.com/office/drawing/2014/main" id="{703F0459-82BC-4FBF-8D7B-B492C0FCC232}"/>
               </a:ext>
             </a:extLst>
           </p:cNvPr>
@@ -4857,7 +4889,7 @@
           <p:cNvPr id="11" name="TextBox 10">
             <a:extLst>
               <a:ext uri="{FF2B5EF4-FFF2-40B4-BE49-F238E27FC236}">
-                <a16:creationId xmlns:a16="http://schemas.microsoft.com/office/drawing/2014/main" xmlns="" id="{EABA38DD-3BDD-4C4E-A19E-1FC23A7B9798}"/>
+                <a16:creationId xmlns="" xmlns:a16="http://schemas.microsoft.com/office/drawing/2014/main" id="{EABA38DD-3BDD-4C4E-A19E-1FC23A7B9798}"/>
               </a:ext>
             </a:extLst>
           </p:cNvPr>
@@ -4895,7 +4927,7 @@
           <p:cNvPr id="4" name="Picture 3" descr="C:\Users\Karin\Google Drive\CS\CS1501\LinearProbingHashST_cut_top.java - Notepad++">
             <a:extLst>
               <a:ext uri="{FF2B5EF4-FFF2-40B4-BE49-F238E27FC236}">
-                <a16:creationId xmlns:a16="http://schemas.microsoft.com/office/drawing/2014/main" xmlns="" id="{D18F70BE-25BB-43C3-9CD0-03ABD1C56EA4}"/>
+                <a16:creationId xmlns="" xmlns:a16="http://schemas.microsoft.com/office/drawing/2014/main" id="{D18F70BE-25BB-43C3-9CD0-03ABD1C56EA4}"/>
               </a:ext>
             </a:extLst>
           </p:cNvPr>
@@ -4930,7 +4962,7 @@
           <p:cNvPr id="7" name="TextBox 6">
             <a:extLst>
               <a:ext uri="{FF2B5EF4-FFF2-40B4-BE49-F238E27FC236}">
-                <a16:creationId xmlns:a16="http://schemas.microsoft.com/office/drawing/2014/main" xmlns="" id="{B238F000-3FD2-4DEC-8BCE-0A710FAC6AEB}"/>
+                <a16:creationId xmlns="" xmlns:a16="http://schemas.microsoft.com/office/drawing/2014/main" id="{B238F000-3FD2-4DEC-8BCE-0A710FAC6AEB}"/>
               </a:ext>
             </a:extLst>
           </p:cNvPr>
@@ -5049,7 +5081,7 @@
           <p:cNvPr id="11" name="TextBox 10">
             <a:extLst>
               <a:ext uri="{FF2B5EF4-FFF2-40B4-BE49-F238E27FC236}">
-                <a16:creationId xmlns:a16="http://schemas.microsoft.com/office/drawing/2014/main" xmlns="" id="{EABA38DD-3BDD-4C4E-A19E-1FC23A7B9798}"/>
+                <a16:creationId xmlns="" xmlns:a16="http://schemas.microsoft.com/office/drawing/2014/main" id="{EABA38DD-3BDD-4C4E-A19E-1FC23A7B9798}"/>
               </a:ext>
             </a:extLst>
           </p:cNvPr>
@@ -5087,7 +5119,7 @@
           <p:cNvPr id="4" name="Picture 3" descr="C:\Users\Karin\Google Drive\CS\CS1501\LinearProbingHashST_cut_top.java - Notepad++">
             <a:extLst>
               <a:ext uri="{FF2B5EF4-FFF2-40B4-BE49-F238E27FC236}">
-                <a16:creationId xmlns:a16="http://schemas.microsoft.com/office/drawing/2014/main" xmlns="" id="{D18F70BE-25BB-43C3-9CD0-03ABD1C56EA4}"/>
+                <a16:creationId xmlns="" xmlns:a16="http://schemas.microsoft.com/office/drawing/2014/main" id="{D18F70BE-25BB-43C3-9CD0-03ABD1C56EA4}"/>
               </a:ext>
             </a:extLst>
           </p:cNvPr>
@@ -5122,7 +5154,7 @@
           <p:cNvPr id="7" name="TextBox 6">
             <a:extLst>
               <a:ext uri="{FF2B5EF4-FFF2-40B4-BE49-F238E27FC236}">
-                <a16:creationId xmlns:a16="http://schemas.microsoft.com/office/drawing/2014/main" xmlns="" id="{B238F000-3FD2-4DEC-8BCE-0A710FAC6AEB}"/>
+                <a16:creationId xmlns="" xmlns:a16="http://schemas.microsoft.com/office/drawing/2014/main" id="{B238F000-3FD2-4DEC-8BCE-0A710FAC6AEB}"/>
               </a:ext>
             </a:extLst>
           </p:cNvPr>
@@ -5253,7 +5285,7 @@
           <p:cNvPr id="5" name="Picture 4">
             <a:extLst>
               <a:ext uri="{FF2B5EF4-FFF2-40B4-BE49-F238E27FC236}">
-                <a16:creationId xmlns:a16="http://schemas.microsoft.com/office/drawing/2014/main" xmlns="" id="{DDE7AA0B-4244-42BB-B16A-52FCE3C52B13}"/>
+                <a16:creationId xmlns="" xmlns:a16="http://schemas.microsoft.com/office/drawing/2014/main" id="{DDE7AA0B-4244-42BB-B16A-52FCE3C52B13}"/>
               </a:ext>
             </a:extLst>
           </p:cNvPr>
@@ -5320,7 +5352,7 @@
           <p:cNvPr id="11" name="TextBox 10">
             <a:extLst>
               <a:ext uri="{FF2B5EF4-FFF2-40B4-BE49-F238E27FC236}">
-                <a16:creationId xmlns:a16="http://schemas.microsoft.com/office/drawing/2014/main" xmlns="" id="{EABA38DD-3BDD-4C4E-A19E-1FC23A7B9798}"/>
+                <a16:creationId xmlns="" xmlns:a16="http://schemas.microsoft.com/office/drawing/2014/main" id="{EABA38DD-3BDD-4C4E-A19E-1FC23A7B9798}"/>
               </a:ext>
             </a:extLst>
           </p:cNvPr>
@@ -5358,7 +5390,7 @@
           <p:cNvPr id="4" name="Picture 3" descr="C:\Users\Karin\Google Drive\CS\CS1501\LinearProbingHashST_cut_top.java - Notepad++">
             <a:extLst>
               <a:ext uri="{FF2B5EF4-FFF2-40B4-BE49-F238E27FC236}">
-                <a16:creationId xmlns:a16="http://schemas.microsoft.com/office/drawing/2014/main" xmlns="" id="{D18F70BE-25BB-43C3-9CD0-03ABD1C56EA4}"/>
+                <a16:creationId xmlns="" xmlns:a16="http://schemas.microsoft.com/office/drawing/2014/main" id="{D18F70BE-25BB-43C3-9CD0-03ABD1C56EA4}"/>
               </a:ext>
             </a:extLst>
           </p:cNvPr>
@@ -5393,7 +5425,7 @@
           <p:cNvPr id="7" name="TextBox 6">
             <a:extLst>
               <a:ext uri="{FF2B5EF4-FFF2-40B4-BE49-F238E27FC236}">
-                <a16:creationId xmlns:a16="http://schemas.microsoft.com/office/drawing/2014/main" xmlns="" id="{B238F000-3FD2-4DEC-8BCE-0A710FAC6AEB}"/>
+                <a16:creationId xmlns="" xmlns:a16="http://schemas.microsoft.com/office/drawing/2014/main" id="{B238F000-3FD2-4DEC-8BCE-0A710FAC6AEB}"/>
               </a:ext>
             </a:extLst>
           </p:cNvPr>
@@ -5524,7 +5556,7 @@
           <p:cNvPr id="5" name="Picture 4">
             <a:extLst>
               <a:ext uri="{FF2B5EF4-FFF2-40B4-BE49-F238E27FC236}">
-                <a16:creationId xmlns:a16="http://schemas.microsoft.com/office/drawing/2014/main" xmlns="" id="{DDE7AA0B-4244-42BB-B16A-52FCE3C52B13}"/>
+                <a16:creationId xmlns="" xmlns:a16="http://schemas.microsoft.com/office/drawing/2014/main" id="{DDE7AA0B-4244-42BB-B16A-52FCE3C52B13}"/>
               </a:ext>
             </a:extLst>
           </p:cNvPr>
@@ -5591,7 +5623,7 @@
           <p:cNvPr id="11" name="TextBox 10">
             <a:extLst>
               <a:ext uri="{FF2B5EF4-FFF2-40B4-BE49-F238E27FC236}">
-                <a16:creationId xmlns:a16="http://schemas.microsoft.com/office/drawing/2014/main" xmlns="" id="{EABA38DD-3BDD-4C4E-A19E-1FC23A7B9798}"/>
+                <a16:creationId xmlns="" xmlns:a16="http://schemas.microsoft.com/office/drawing/2014/main" id="{EABA38DD-3BDD-4C4E-A19E-1FC23A7B9798}"/>
               </a:ext>
             </a:extLst>
           </p:cNvPr>
@@ -5754,7 +5786,7 @@
           <p:cNvPr id="3" name="TextBox 2">
             <a:extLst>
               <a:ext uri="{FF2B5EF4-FFF2-40B4-BE49-F238E27FC236}">
-                <a16:creationId xmlns:a16="http://schemas.microsoft.com/office/drawing/2014/main" xmlns="" id="{3F6396DE-B199-4A79-B302-CDA9DD94D8E8}"/>
+                <a16:creationId xmlns="" xmlns:a16="http://schemas.microsoft.com/office/drawing/2014/main" id="{3F6396DE-B199-4A79-B302-CDA9DD94D8E8}"/>
               </a:ext>
             </a:extLst>
           </p:cNvPr>
@@ -5789,7 +5821,7 @@
           <p:cNvPr id="4" name="TextBox 3">
             <a:extLst>
               <a:ext uri="{FF2B5EF4-FFF2-40B4-BE49-F238E27FC236}">
-                <a16:creationId xmlns:a16="http://schemas.microsoft.com/office/drawing/2014/main" xmlns="" id="{1D13B0E6-AF69-40D7-B71F-0D333C38767F}"/>
+                <a16:creationId xmlns="" xmlns:a16="http://schemas.microsoft.com/office/drawing/2014/main" id="{1D13B0E6-AF69-40D7-B71F-0D333C38767F}"/>
               </a:ext>
             </a:extLst>
           </p:cNvPr>
@@ -5844,7 +5876,7 @@
           <p:cNvPr id="8" name="TextBox 7">
             <a:extLst>
               <a:ext uri="{FF2B5EF4-FFF2-40B4-BE49-F238E27FC236}">
-                <a16:creationId xmlns:a16="http://schemas.microsoft.com/office/drawing/2014/main" xmlns="" id="{690BCE98-B0FD-404D-953F-51A8D4468E36}"/>
+                <a16:creationId xmlns="" xmlns:a16="http://schemas.microsoft.com/office/drawing/2014/main" id="{690BCE98-B0FD-404D-953F-51A8D4468E36}"/>
               </a:ext>
             </a:extLst>
           </p:cNvPr>
@@ -5879,7 +5911,7 @@
           <p:cNvPr id="9" name="Table 9">
             <a:extLst>
               <a:ext uri="{FF2B5EF4-FFF2-40B4-BE49-F238E27FC236}">
-                <a16:creationId xmlns:a16="http://schemas.microsoft.com/office/drawing/2014/main" xmlns="" id="{481A7B80-AEC2-442F-8489-88D0C7B2D5BA}"/>
+                <a16:creationId xmlns="" xmlns:a16="http://schemas.microsoft.com/office/drawing/2014/main" id="{481A7B80-AEC2-442F-8489-88D0C7B2D5BA}"/>
               </a:ext>
             </a:extLst>
           </p:cNvPr>
@@ -5908,77 +5940,77 @@
                 <a:gridCol w="554182">
                   <a:extLst>
                     <a:ext uri="{9D8B030D-6E8A-4147-A177-3AD203B41FA5}">
-                      <a16:colId xmlns:a16="http://schemas.microsoft.com/office/drawing/2014/main" xmlns="" val="744068991"/>
+                      <a16:colId xmlns="" xmlns:a16="http://schemas.microsoft.com/office/drawing/2014/main" val="744068991"/>
                     </a:ext>
                   </a:extLst>
                 </a:gridCol>
                 <a:gridCol w="554182">
                   <a:extLst>
                     <a:ext uri="{9D8B030D-6E8A-4147-A177-3AD203B41FA5}">
-                      <a16:colId xmlns:a16="http://schemas.microsoft.com/office/drawing/2014/main" xmlns="" val="3308526507"/>
+                      <a16:colId xmlns="" xmlns:a16="http://schemas.microsoft.com/office/drawing/2014/main" val="3308526507"/>
                     </a:ext>
                   </a:extLst>
                 </a:gridCol>
                 <a:gridCol w="554182">
                   <a:extLst>
                     <a:ext uri="{9D8B030D-6E8A-4147-A177-3AD203B41FA5}">
-                      <a16:colId xmlns:a16="http://schemas.microsoft.com/office/drawing/2014/main" xmlns="" val="1286620001"/>
+                      <a16:colId xmlns="" xmlns:a16="http://schemas.microsoft.com/office/drawing/2014/main" val="1286620001"/>
                     </a:ext>
                   </a:extLst>
                 </a:gridCol>
                 <a:gridCol w="554182">
                   <a:extLst>
                     <a:ext uri="{9D8B030D-6E8A-4147-A177-3AD203B41FA5}">
-                      <a16:colId xmlns:a16="http://schemas.microsoft.com/office/drawing/2014/main" xmlns="" val="4003635970"/>
+                      <a16:colId xmlns="" xmlns:a16="http://schemas.microsoft.com/office/drawing/2014/main" val="4003635970"/>
                     </a:ext>
                   </a:extLst>
                 </a:gridCol>
                 <a:gridCol w="554182">
                   <a:extLst>
                     <a:ext uri="{9D8B030D-6E8A-4147-A177-3AD203B41FA5}">
-                      <a16:colId xmlns:a16="http://schemas.microsoft.com/office/drawing/2014/main" xmlns="" val="3440982615"/>
+                      <a16:colId xmlns="" xmlns:a16="http://schemas.microsoft.com/office/drawing/2014/main" val="3440982615"/>
                     </a:ext>
                   </a:extLst>
                 </a:gridCol>
                 <a:gridCol w="554182">
                   <a:extLst>
                     <a:ext uri="{9D8B030D-6E8A-4147-A177-3AD203B41FA5}">
-                      <a16:colId xmlns:a16="http://schemas.microsoft.com/office/drawing/2014/main" xmlns="" val="761235024"/>
+                      <a16:colId xmlns="" xmlns:a16="http://schemas.microsoft.com/office/drawing/2014/main" val="761235024"/>
                     </a:ext>
                   </a:extLst>
                 </a:gridCol>
                 <a:gridCol w="554182">
                   <a:extLst>
                     <a:ext uri="{9D8B030D-6E8A-4147-A177-3AD203B41FA5}">
-                      <a16:colId xmlns:a16="http://schemas.microsoft.com/office/drawing/2014/main" xmlns="" val="1110123748"/>
+                      <a16:colId xmlns="" xmlns:a16="http://schemas.microsoft.com/office/drawing/2014/main" val="1110123748"/>
                     </a:ext>
                   </a:extLst>
                 </a:gridCol>
                 <a:gridCol w="554182">
                   <a:extLst>
                     <a:ext uri="{9D8B030D-6E8A-4147-A177-3AD203B41FA5}">
-                      <a16:colId xmlns:a16="http://schemas.microsoft.com/office/drawing/2014/main" xmlns="" val="221974964"/>
+                      <a16:colId xmlns="" xmlns:a16="http://schemas.microsoft.com/office/drawing/2014/main" val="221974964"/>
                     </a:ext>
                   </a:extLst>
                 </a:gridCol>
                 <a:gridCol w="554182">
                   <a:extLst>
                     <a:ext uri="{9D8B030D-6E8A-4147-A177-3AD203B41FA5}">
-                      <a16:colId xmlns:a16="http://schemas.microsoft.com/office/drawing/2014/main" xmlns="" val="3520607064"/>
+                      <a16:colId xmlns="" xmlns:a16="http://schemas.microsoft.com/office/drawing/2014/main" val="3520607064"/>
                     </a:ext>
                   </a:extLst>
                 </a:gridCol>
                 <a:gridCol w="554182">
                   <a:extLst>
                     <a:ext uri="{9D8B030D-6E8A-4147-A177-3AD203B41FA5}">
-                      <a16:colId xmlns:a16="http://schemas.microsoft.com/office/drawing/2014/main" xmlns="" val="1351787277"/>
+                      <a16:colId xmlns="" xmlns:a16="http://schemas.microsoft.com/office/drawing/2014/main" val="1351787277"/>
                     </a:ext>
                   </a:extLst>
                 </a:gridCol>
                 <a:gridCol w="554182">
                   <a:extLst>
                     <a:ext uri="{9D8B030D-6E8A-4147-A177-3AD203B41FA5}">
-                      <a16:colId xmlns:a16="http://schemas.microsoft.com/office/drawing/2014/main" xmlns="" val="38250742"/>
+                      <a16:colId xmlns="" xmlns:a16="http://schemas.microsoft.com/office/drawing/2014/main" val="38250742"/>
                     </a:ext>
                   </a:extLst>
                 </a:gridCol>
@@ -6602,7 +6634,7 @@
                 </a:tc>
                 <a:extLst>
                   <a:ext uri="{0D108BD9-81ED-4DB2-BD59-A6C34878D82A}">
-                    <a16:rowId xmlns:a16="http://schemas.microsoft.com/office/drawing/2014/main" xmlns="" val="678417851"/>
+                    <a16:rowId xmlns="" xmlns:a16="http://schemas.microsoft.com/office/drawing/2014/main" val="678417851"/>
                   </a:ext>
                 </a:extLst>
               </a:tr>
@@ -6615,7 +6647,7 @@
           <p:cNvPr id="13" name="TextBox 12">
             <a:extLst>
               <a:ext uri="{FF2B5EF4-FFF2-40B4-BE49-F238E27FC236}">
-                <a16:creationId xmlns:a16="http://schemas.microsoft.com/office/drawing/2014/main" xmlns="" id="{5257C30E-309E-4EF6-AACF-BE6F22683752}"/>
+                <a16:creationId xmlns="" xmlns:a16="http://schemas.microsoft.com/office/drawing/2014/main" id="{5257C30E-309E-4EF6-AACF-BE6F22683752}"/>
               </a:ext>
             </a:extLst>
           </p:cNvPr>
@@ -6686,7 +6718,7 @@
           <p:cNvPr id="15" name="Table 9">
             <a:extLst>
               <a:ext uri="{FF2B5EF4-FFF2-40B4-BE49-F238E27FC236}">
-                <a16:creationId xmlns:a16="http://schemas.microsoft.com/office/drawing/2014/main" xmlns="" id="{EA868138-EF44-45B9-85ED-E72FFFE8D14F}"/>
+                <a16:creationId xmlns="" xmlns:a16="http://schemas.microsoft.com/office/drawing/2014/main" id="{EA868138-EF44-45B9-85ED-E72FFFE8D14F}"/>
               </a:ext>
             </a:extLst>
           </p:cNvPr>
@@ -6715,77 +6747,77 @@
                 <a:gridCol w="554182">
                   <a:extLst>
                     <a:ext uri="{9D8B030D-6E8A-4147-A177-3AD203B41FA5}">
-                      <a16:colId xmlns:a16="http://schemas.microsoft.com/office/drawing/2014/main" xmlns="" val="744068991"/>
+                      <a16:colId xmlns="" xmlns:a16="http://schemas.microsoft.com/office/drawing/2014/main" val="744068991"/>
                     </a:ext>
                   </a:extLst>
                 </a:gridCol>
                 <a:gridCol w="554182">
                   <a:extLst>
                     <a:ext uri="{9D8B030D-6E8A-4147-A177-3AD203B41FA5}">
-                      <a16:colId xmlns:a16="http://schemas.microsoft.com/office/drawing/2014/main" xmlns="" val="3308526507"/>
+                      <a16:colId xmlns="" xmlns:a16="http://schemas.microsoft.com/office/drawing/2014/main" val="3308526507"/>
                     </a:ext>
                   </a:extLst>
                 </a:gridCol>
                 <a:gridCol w="554182">
                   <a:extLst>
                     <a:ext uri="{9D8B030D-6E8A-4147-A177-3AD203B41FA5}">
-                      <a16:colId xmlns:a16="http://schemas.microsoft.com/office/drawing/2014/main" xmlns="" val="1286620001"/>
+                      <a16:colId xmlns="" xmlns:a16="http://schemas.microsoft.com/office/drawing/2014/main" val="1286620001"/>
                     </a:ext>
                   </a:extLst>
                 </a:gridCol>
                 <a:gridCol w="554182">
                   <a:extLst>
                     <a:ext uri="{9D8B030D-6E8A-4147-A177-3AD203B41FA5}">
-                      <a16:colId xmlns:a16="http://schemas.microsoft.com/office/drawing/2014/main" xmlns="" val="4003635970"/>
+                      <a16:colId xmlns="" xmlns:a16="http://schemas.microsoft.com/office/drawing/2014/main" val="4003635970"/>
                     </a:ext>
                   </a:extLst>
                 </a:gridCol>
                 <a:gridCol w="554182">
                   <a:extLst>
                     <a:ext uri="{9D8B030D-6E8A-4147-A177-3AD203B41FA5}">
-                      <a16:colId xmlns:a16="http://schemas.microsoft.com/office/drawing/2014/main" xmlns="" val="3440982615"/>
+                      <a16:colId xmlns="" xmlns:a16="http://schemas.microsoft.com/office/drawing/2014/main" val="3440982615"/>
                     </a:ext>
                   </a:extLst>
                 </a:gridCol>
                 <a:gridCol w="554182">
                   <a:extLst>
                     <a:ext uri="{9D8B030D-6E8A-4147-A177-3AD203B41FA5}">
-                      <a16:colId xmlns:a16="http://schemas.microsoft.com/office/drawing/2014/main" xmlns="" val="3920189962"/>
+                      <a16:colId xmlns="" xmlns:a16="http://schemas.microsoft.com/office/drawing/2014/main" val="3920189962"/>
                     </a:ext>
                   </a:extLst>
                 </a:gridCol>
                 <a:gridCol w="554182">
                   <a:extLst>
                     <a:ext uri="{9D8B030D-6E8A-4147-A177-3AD203B41FA5}">
-                      <a16:colId xmlns:a16="http://schemas.microsoft.com/office/drawing/2014/main" xmlns="" val="761235024"/>
+                      <a16:colId xmlns="" xmlns:a16="http://schemas.microsoft.com/office/drawing/2014/main" val="761235024"/>
                     </a:ext>
                   </a:extLst>
                 </a:gridCol>
                 <a:gridCol w="554182">
                   <a:extLst>
                     <a:ext uri="{9D8B030D-6E8A-4147-A177-3AD203B41FA5}">
-                      <a16:colId xmlns:a16="http://schemas.microsoft.com/office/drawing/2014/main" xmlns="" val="1110123748"/>
+                      <a16:colId xmlns="" xmlns:a16="http://schemas.microsoft.com/office/drawing/2014/main" val="1110123748"/>
                     </a:ext>
                   </a:extLst>
                 </a:gridCol>
                 <a:gridCol w="554182">
                   <a:extLst>
                     <a:ext uri="{9D8B030D-6E8A-4147-A177-3AD203B41FA5}">
-                      <a16:colId xmlns:a16="http://schemas.microsoft.com/office/drawing/2014/main" xmlns="" val="221974964"/>
+                      <a16:colId xmlns="" xmlns:a16="http://schemas.microsoft.com/office/drawing/2014/main" val="221974964"/>
                     </a:ext>
                   </a:extLst>
                 </a:gridCol>
                 <a:gridCol w="554182">
                   <a:extLst>
                     <a:ext uri="{9D8B030D-6E8A-4147-A177-3AD203B41FA5}">
-                      <a16:colId xmlns:a16="http://schemas.microsoft.com/office/drawing/2014/main" xmlns="" val="3520607064"/>
+                      <a16:colId xmlns="" xmlns:a16="http://schemas.microsoft.com/office/drawing/2014/main" val="3520607064"/>
                     </a:ext>
                   </a:extLst>
                 </a:gridCol>
                 <a:gridCol w="554182">
                   <a:extLst>
                     <a:ext uri="{9D8B030D-6E8A-4147-A177-3AD203B41FA5}">
-                      <a16:colId xmlns:a16="http://schemas.microsoft.com/office/drawing/2014/main" xmlns="" val="1351787277"/>
+                      <a16:colId xmlns="" xmlns:a16="http://schemas.microsoft.com/office/drawing/2014/main" val="1351787277"/>
                     </a:ext>
                   </a:extLst>
                 </a:gridCol>
@@ -7409,7 +7441,7 @@
                 </a:tc>
                 <a:extLst>
                   <a:ext uri="{0D108BD9-81ED-4DB2-BD59-A6C34878D82A}">
-                    <a16:rowId xmlns:a16="http://schemas.microsoft.com/office/drawing/2014/main" xmlns="" val="678417851"/>
+                    <a16:rowId xmlns="" xmlns:a16="http://schemas.microsoft.com/office/drawing/2014/main" val="678417851"/>
                   </a:ext>
                 </a:extLst>
               </a:tr>
@@ -7422,7 +7454,7 @@
           <p:cNvPr id="19" name="TextBox 18">
             <a:extLst>
               <a:ext uri="{FF2B5EF4-FFF2-40B4-BE49-F238E27FC236}">
-                <a16:creationId xmlns:a16="http://schemas.microsoft.com/office/drawing/2014/main" xmlns="" id="{47022750-0B81-4745-B06F-C2542EBD6B6C}"/>
+                <a16:creationId xmlns="" xmlns:a16="http://schemas.microsoft.com/office/drawing/2014/main" id="{47022750-0B81-4745-B06F-C2542EBD6B6C}"/>
               </a:ext>
             </a:extLst>
           </p:cNvPr>
@@ -7467,15 +7499,7 @@
                   <a:srgbClr val="00B050"/>
                 </a:solidFill>
               </a:rPr>
-              <a:t> for </a:t>
-            </a:r>
-            <a:r>
-              <a:rPr lang="en-US" sz="1600" dirty="0">
-                <a:solidFill>
-                  <a:srgbClr val="00B050"/>
-                </a:solidFill>
-              </a:rPr>
-              <a:t>keys (</a:t>
+              <a:t> for keys (</a:t>
             </a:r>
             <a:r>
               <a:rPr lang="en-US" sz="1600" i="1" dirty="0">
@@ -7516,7 +7540,7 @@
           <p:cNvPr id="28" name="TextBox 27">
             <a:extLst>
               <a:ext uri="{FF2B5EF4-FFF2-40B4-BE49-F238E27FC236}">
-                <a16:creationId xmlns:a16="http://schemas.microsoft.com/office/drawing/2014/main" xmlns="" id="{F0BA7454-7673-47FF-9635-6F48D08646B3}"/>
+                <a16:creationId xmlns="" xmlns:a16="http://schemas.microsoft.com/office/drawing/2014/main" id="{F0BA7454-7673-47FF-9635-6F48D08646B3}"/>
               </a:ext>
             </a:extLst>
           </p:cNvPr>
@@ -7551,7 +7575,7 @@
           <p:cNvPr id="29" name="TextBox 28">
             <a:extLst>
               <a:ext uri="{FF2B5EF4-FFF2-40B4-BE49-F238E27FC236}">
-                <a16:creationId xmlns:a16="http://schemas.microsoft.com/office/drawing/2014/main" xmlns="" id="{19DCF6F7-F6B3-489C-B987-A166685C71C6}"/>
+                <a16:creationId xmlns="" xmlns:a16="http://schemas.microsoft.com/office/drawing/2014/main" id="{19DCF6F7-F6B3-489C-B987-A166685C71C6}"/>
               </a:ext>
             </a:extLst>
           </p:cNvPr>
@@ -8013,7 +8037,7 @@
           <p:cNvPr id="11" name="TextBox 10">
             <a:extLst>
               <a:ext uri="{FF2B5EF4-FFF2-40B4-BE49-F238E27FC236}">
-                <a16:creationId xmlns:a16="http://schemas.microsoft.com/office/drawing/2014/main" xmlns="" id="{EABA38DD-3BDD-4C4E-A19E-1FC23A7B9798}"/>
+                <a16:creationId xmlns="" xmlns:a16="http://schemas.microsoft.com/office/drawing/2014/main" id="{EABA38DD-3BDD-4C4E-A19E-1FC23A7B9798}"/>
               </a:ext>
             </a:extLst>
           </p:cNvPr>
@@ -8056,7 +8080,7 @@
           <p:cNvPr id="4" name="Picture 3" descr="C:\Users\Karin\Google Drive\CS\CS1501\LinearProbingHashST.java - Notepad++">
             <a:extLst>
               <a:ext uri="{FF2B5EF4-FFF2-40B4-BE49-F238E27FC236}">
-                <a16:creationId xmlns:a16="http://schemas.microsoft.com/office/drawing/2014/main" xmlns="" id="{52F602DC-0E13-46DD-8FE9-77FAAD0B51A1}"/>
+                <a16:creationId xmlns="" xmlns:a16="http://schemas.microsoft.com/office/drawing/2014/main" id="{52F602DC-0E13-46DD-8FE9-77FAAD0B51A1}"/>
               </a:ext>
             </a:extLst>
           </p:cNvPr>
@@ -8127,7 +8151,7 @@
           <p:cNvPr id="8" name="TextBox 7">
             <a:extLst>
               <a:ext uri="{FF2B5EF4-FFF2-40B4-BE49-F238E27FC236}">
-                <a16:creationId xmlns:a16="http://schemas.microsoft.com/office/drawing/2014/main" xmlns="" id="{22DADF2F-D5C9-49BD-B7A2-4AB616DCABCF}"/>
+                <a16:creationId xmlns="" xmlns:a16="http://schemas.microsoft.com/office/drawing/2014/main" id="{22DADF2F-D5C9-49BD-B7A2-4AB616DCABCF}"/>
               </a:ext>
             </a:extLst>
           </p:cNvPr>
@@ -8341,7 +8365,7 @@
           <p:cNvPr id="11" name="TextBox 10">
             <a:extLst>
               <a:ext uri="{FF2B5EF4-FFF2-40B4-BE49-F238E27FC236}">
-                <a16:creationId xmlns:a16="http://schemas.microsoft.com/office/drawing/2014/main" xmlns="" id="{EABA38DD-3BDD-4C4E-A19E-1FC23A7B9798}"/>
+                <a16:creationId xmlns="" xmlns:a16="http://schemas.microsoft.com/office/drawing/2014/main" id="{EABA38DD-3BDD-4C4E-A19E-1FC23A7B9798}"/>
               </a:ext>
             </a:extLst>
           </p:cNvPr>
@@ -8552,7 +8576,7 @@
           <p:cNvPr id="21" name="TextBox 20">
             <a:extLst>
               <a:ext uri="{FF2B5EF4-FFF2-40B4-BE49-F238E27FC236}">
-                <a16:creationId xmlns:a16="http://schemas.microsoft.com/office/drawing/2014/main" xmlns="" id="{EABA38DD-3BDD-4C4E-A19E-1FC23A7B9798}"/>
+                <a16:creationId xmlns="" xmlns:a16="http://schemas.microsoft.com/office/drawing/2014/main" id="{EABA38DD-3BDD-4C4E-A19E-1FC23A7B9798}"/>
               </a:ext>
             </a:extLst>
           </p:cNvPr>
@@ -8632,7 +8656,7 @@
           <p:cNvPr id="11" name="TextBox 10">
             <a:extLst>
               <a:ext uri="{FF2B5EF4-FFF2-40B4-BE49-F238E27FC236}">
-                <a16:creationId xmlns:a16="http://schemas.microsoft.com/office/drawing/2014/main" xmlns="" id="{EABA38DD-3BDD-4C4E-A19E-1FC23A7B9798}"/>
+                <a16:creationId xmlns="" xmlns:a16="http://schemas.microsoft.com/office/drawing/2014/main" id="{EABA38DD-3BDD-4C4E-A19E-1FC23A7B9798}"/>
               </a:ext>
             </a:extLst>
           </p:cNvPr>
@@ -8675,7 +8699,7 @@
           <p:cNvPr id="21" name="TextBox 20">
             <a:extLst>
               <a:ext uri="{FF2B5EF4-FFF2-40B4-BE49-F238E27FC236}">
-                <a16:creationId xmlns:a16="http://schemas.microsoft.com/office/drawing/2014/main" xmlns="" id="{EABA38DD-3BDD-4C4E-A19E-1FC23A7B9798}"/>
+                <a16:creationId xmlns="" xmlns:a16="http://schemas.microsoft.com/office/drawing/2014/main" id="{EABA38DD-3BDD-4C4E-A19E-1FC23A7B9798}"/>
               </a:ext>
             </a:extLst>
           </p:cNvPr>
@@ -8845,7 +8869,7 @@
           <p:cNvPr id="16" name="TextBox 15">
             <a:extLst>
               <a:ext uri="{FF2B5EF4-FFF2-40B4-BE49-F238E27FC236}">
-                <a16:creationId xmlns:a16="http://schemas.microsoft.com/office/drawing/2014/main" xmlns="" id="{6A05D000-55D0-4EF6-BC43-32A2C2B179DA}"/>
+                <a16:creationId xmlns="" xmlns:a16="http://schemas.microsoft.com/office/drawing/2014/main" id="{6A05D000-55D0-4EF6-BC43-32A2C2B179DA}"/>
               </a:ext>
             </a:extLst>
           </p:cNvPr>
@@ -8880,7 +8904,7 @@
           <p:cNvPr id="17" name="TextBox 16">
             <a:extLst>
               <a:ext uri="{FF2B5EF4-FFF2-40B4-BE49-F238E27FC236}">
-                <a16:creationId xmlns:a16="http://schemas.microsoft.com/office/drawing/2014/main" xmlns="" id="{7B66F21F-48C7-45E2-8B79-E2A3809EC3A9}"/>
+                <a16:creationId xmlns="" xmlns:a16="http://schemas.microsoft.com/office/drawing/2014/main" id="{7B66F21F-48C7-45E2-8B79-E2A3809EC3A9}"/>
               </a:ext>
             </a:extLst>
           </p:cNvPr>
@@ -8935,7 +8959,7 @@
           <p:cNvPr id="20" name="TextBox 19">
             <a:extLst>
               <a:ext uri="{FF2B5EF4-FFF2-40B4-BE49-F238E27FC236}">
-                <a16:creationId xmlns:a16="http://schemas.microsoft.com/office/drawing/2014/main" xmlns="" id="{3EAC9A84-5E58-466E-8A16-E1A45B1D169C}"/>
+                <a16:creationId xmlns="" xmlns:a16="http://schemas.microsoft.com/office/drawing/2014/main" id="{3EAC9A84-5E58-466E-8A16-E1A45B1D169C}"/>
               </a:ext>
             </a:extLst>
           </p:cNvPr>
@@ -8970,7 +8994,7 @@
           <p:cNvPr id="10" name="Group 9">
             <a:extLst>
               <a:ext uri="{FF2B5EF4-FFF2-40B4-BE49-F238E27FC236}">
-                <a16:creationId xmlns:a16="http://schemas.microsoft.com/office/drawing/2014/main" xmlns="" id="{6535EA16-00CF-4176-BA93-2247015E30B3}"/>
+                <a16:creationId xmlns="" xmlns:a16="http://schemas.microsoft.com/office/drawing/2014/main" id="{6535EA16-00CF-4176-BA93-2247015E30B3}"/>
               </a:ext>
             </a:extLst>
           </p:cNvPr>
@@ -8990,7 +9014,7 @@
             <p:cNvPr id="7" name="Picture 6">
               <a:extLst>
                 <a:ext uri="{FF2B5EF4-FFF2-40B4-BE49-F238E27FC236}">
-                  <a16:creationId xmlns:a16="http://schemas.microsoft.com/office/drawing/2014/main" xmlns="" id="{A24FA168-D588-40E3-B179-3E95C94FA2E0}"/>
+                  <a16:creationId xmlns="" xmlns:a16="http://schemas.microsoft.com/office/drawing/2014/main" id="{A24FA168-D588-40E3-B179-3E95C94FA2E0}"/>
                 </a:ext>
               </a:extLst>
             </p:cNvPr>
@@ -9020,7 +9044,7 @@
             <p:cNvPr id="21" name="TextBox 20">
               <a:extLst>
                 <a:ext uri="{FF2B5EF4-FFF2-40B4-BE49-F238E27FC236}">
-                  <a16:creationId xmlns:a16="http://schemas.microsoft.com/office/drawing/2014/main" xmlns="" id="{32302902-B3B6-4B94-9017-FA14DAF40A54}"/>
+                  <a16:creationId xmlns="" xmlns:a16="http://schemas.microsoft.com/office/drawing/2014/main" id="{32302902-B3B6-4B94-9017-FA14DAF40A54}"/>
                 </a:ext>
               </a:extLst>
             </p:cNvPr>
@@ -9060,7 +9084,7 @@
           <p:cNvPr id="24" name="TextBox 23">
             <a:extLst>
               <a:ext uri="{FF2B5EF4-FFF2-40B4-BE49-F238E27FC236}">
-                <a16:creationId xmlns:a16="http://schemas.microsoft.com/office/drawing/2014/main" xmlns="" id="{C61DDED0-963E-4F89-B934-0E0D301193C9}"/>
+                <a16:creationId xmlns="" xmlns:a16="http://schemas.microsoft.com/office/drawing/2014/main" id="{C61DDED0-963E-4F89-B934-0E0D301193C9}"/>
               </a:ext>
             </a:extLst>
           </p:cNvPr>
@@ -9095,7 +9119,7 @@
           <p:cNvPr id="27" name="TextBox 26">
             <a:extLst>
               <a:ext uri="{FF2B5EF4-FFF2-40B4-BE49-F238E27FC236}">
-                <a16:creationId xmlns:a16="http://schemas.microsoft.com/office/drawing/2014/main" xmlns="" id="{F605134D-125E-4D8A-A004-BB76E17A1EEC}"/>
+                <a16:creationId xmlns="" xmlns:a16="http://schemas.microsoft.com/office/drawing/2014/main" id="{F605134D-125E-4D8A-A004-BB76E17A1EEC}"/>
               </a:ext>
             </a:extLst>
           </p:cNvPr>
@@ -9470,7 +9494,7 @@
           <p:cNvPr id="16" name="TextBox 15">
             <a:extLst>
               <a:ext uri="{FF2B5EF4-FFF2-40B4-BE49-F238E27FC236}">
-                <a16:creationId xmlns:a16="http://schemas.microsoft.com/office/drawing/2014/main" xmlns="" id="{6A05D000-55D0-4EF6-BC43-32A2C2B179DA}"/>
+                <a16:creationId xmlns="" xmlns:a16="http://schemas.microsoft.com/office/drawing/2014/main" id="{6A05D000-55D0-4EF6-BC43-32A2C2B179DA}"/>
               </a:ext>
             </a:extLst>
           </p:cNvPr>
@@ -9505,7 +9529,7 @@
           <p:cNvPr id="17" name="TextBox 16">
             <a:extLst>
               <a:ext uri="{FF2B5EF4-FFF2-40B4-BE49-F238E27FC236}">
-                <a16:creationId xmlns:a16="http://schemas.microsoft.com/office/drawing/2014/main" xmlns="" id="{7B66F21F-48C7-45E2-8B79-E2A3809EC3A9}"/>
+                <a16:creationId xmlns="" xmlns:a16="http://schemas.microsoft.com/office/drawing/2014/main" id="{7B66F21F-48C7-45E2-8B79-E2A3809EC3A9}"/>
               </a:ext>
             </a:extLst>
           </p:cNvPr>
@@ -9541,7 +9565,7 @@
           <p:cNvPr id="11" name="TextBox 10">
             <a:extLst>
               <a:ext uri="{FF2B5EF4-FFF2-40B4-BE49-F238E27FC236}">
-                <a16:creationId xmlns:a16="http://schemas.microsoft.com/office/drawing/2014/main" xmlns="" id="{325E9286-F50E-49E1-856B-40356292D7A0}"/>
+                <a16:creationId xmlns="" xmlns:a16="http://schemas.microsoft.com/office/drawing/2014/main" id="{325E9286-F50E-49E1-856B-40356292D7A0}"/>
               </a:ext>
             </a:extLst>
           </p:cNvPr>
@@ -9772,7 +9796,7 @@
           <p:cNvPr id="2" name="TextBox 1">
             <a:extLst>
               <a:ext uri="{FF2B5EF4-FFF2-40B4-BE49-F238E27FC236}">
-                <a16:creationId xmlns:a16="http://schemas.microsoft.com/office/drawing/2014/main" xmlns="" id="{5A292BA9-126E-4A9A-B763-0D76246BE478}"/>
+                <a16:creationId xmlns="" xmlns:a16="http://schemas.microsoft.com/office/drawing/2014/main" id="{5A292BA9-126E-4A9A-B763-0D76246BE478}"/>
               </a:ext>
             </a:extLst>
           </p:cNvPr>
@@ -9832,7 +9856,7 @@
           <p:cNvPr id="8" name="TextBox 7">
             <a:extLst>
               <a:ext uri="{FF2B5EF4-FFF2-40B4-BE49-F238E27FC236}">
-                <a16:creationId xmlns:a16="http://schemas.microsoft.com/office/drawing/2014/main" xmlns="" id="{4BD7BFBE-7687-42AA-ADD6-3390ADD2BEF8}"/>
+                <a16:creationId xmlns="" xmlns:a16="http://schemas.microsoft.com/office/drawing/2014/main" id="{4BD7BFBE-7687-42AA-ADD6-3390ADD2BEF8}"/>
               </a:ext>
             </a:extLst>
           </p:cNvPr>
@@ -9867,7 +9891,7 @@
           <p:cNvPr id="12" name="Picture 11">
             <a:extLst>
               <a:ext uri="{FF2B5EF4-FFF2-40B4-BE49-F238E27FC236}">
-                <a16:creationId xmlns:a16="http://schemas.microsoft.com/office/drawing/2014/main" xmlns="" id="{0256A8E3-C203-4A84-BEEF-1DF472AA2DE3}"/>
+                <a16:creationId xmlns="" xmlns:a16="http://schemas.microsoft.com/office/drawing/2014/main" id="{0256A8E3-C203-4A84-BEEF-1DF472AA2DE3}"/>
               </a:ext>
             </a:extLst>
           </p:cNvPr>
@@ -9897,7 +9921,7 @@
           <p:cNvPr id="6" name="TextBox 5">
             <a:extLst>
               <a:ext uri="{FF2B5EF4-FFF2-40B4-BE49-F238E27FC236}">
-                <a16:creationId xmlns:a16="http://schemas.microsoft.com/office/drawing/2014/main" xmlns="" id="{EE73D387-D24D-4724-ABC0-B6904092A46C}"/>
+                <a16:creationId xmlns="" xmlns:a16="http://schemas.microsoft.com/office/drawing/2014/main" id="{EE73D387-D24D-4724-ABC0-B6904092A46C}"/>
               </a:ext>
             </a:extLst>
           </p:cNvPr>
@@ -9958,7 +9982,7 @@
           <p:cNvPr id="11" name="Table 9">
             <a:extLst>
               <a:ext uri="{FF2B5EF4-FFF2-40B4-BE49-F238E27FC236}">
-                <a16:creationId xmlns:a16="http://schemas.microsoft.com/office/drawing/2014/main" xmlns="" id="{4EAA6B66-A0C6-4B24-9E51-678E053C57D5}"/>
+                <a16:creationId xmlns="" xmlns:a16="http://schemas.microsoft.com/office/drawing/2014/main" id="{4EAA6B66-A0C6-4B24-9E51-678E053C57D5}"/>
               </a:ext>
             </a:extLst>
           </p:cNvPr>
@@ -9987,77 +10011,77 @@
                 <a:gridCol w="554182">
                   <a:extLst>
                     <a:ext uri="{9D8B030D-6E8A-4147-A177-3AD203B41FA5}">
-                      <a16:colId xmlns:a16="http://schemas.microsoft.com/office/drawing/2014/main" xmlns="" val="744068991"/>
+                      <a16:colId xmlns="" xmlns:a16="http://schemas.microsoft.com/office/drawing/2014/main" val="744068991"/>
                     </a:ext>
                   </a:extLst>
                 </a:gridCol>
                 <a:gridCol w="554182">
                   <a:extLst>
                     <a:ext uri="{9D8B030D-6E8A-4147-A177-3AD203B41FA5}">
-                      <a16:colId xmlns:a16="http://schemas.microsoft.com/office/drawing/2014/main" xmlns="" val="3308526507"/>
+                      <a16:colId xmlns="" xmlns:a16="http://schemas.microsoft.com/office/drawing/2014/main" val="3308526507"/>
                     </a:ext>
                   </a:extLst>
                 </a:gridCol>
                 <a:gridCol w="554182">
                   <a:extLst>
                     <a:ext uri="{9D8B030D-6E8A-4147-A177-3AD203B41FA5}">
-                      <a16:colId xmlns:a16="http://schemas.microsoft.com/office/drawing/2014/main" xmlns="" val="1286620001"/>
+                      <a16:colId xmlns="" xmlns:a16="http://schemas.microsoft.com/office/drawing/2014/main" val="1286620001"/>
                     </a:ext>
                   </a:extLst>
                 </a:gridCol>
                 <a:gridCol w="554182">
                   <a:extLst>
                     <a:ext uri="{9D8B030D-6E8A-4147-A177-3AD203B41FA5}">
-                      <a16:colId xmlns:a16="http://schemas.microsoft.com/office/drawing/2014/main" xmlns="" val="4003635970"/>
+                      <a16:colId xmlns="" xmlns:a16="http://schemas.microsoft.com/office/drawing/2014/main" val="4003635970"/>
                     </a:ext>
                   </a:extLst>
                 </a:gridCol>
                 <a:gridCol w="554182">
                   <a:extLst>
                     <a:ext uri="{9D8B030D-6E8A-4147-A177-3AD203B41FA5}">
-                      <a16:colId xmlns:a16="http://schemas.microsoft.com/office/drawing/2014/main" xmlns="" val="3440982615"/>
+                      <a16:colId xmlns="" xmlns:a16="http://schemas.microsoft.com/office/drawing/2014/main" val="3440982615"/>
                     </a:ext>
                   </a:extLst>
                 </a:gridCol>
                 <a:gridCol w="554182">
                   <a:extLst>
                     <a:ext uri="{9D8B030D-6E8A-4147-A177-3AD203B41FA5}">
-                      <a16:colId xmlns:a16="http://schemas.microsoft.com/office/drawing/2014/main" xmlns="" val="761235024"/>
+                      <a16:colId xmlns="" xmlns:a16="http://schemas.microsoft.com/office/drawing/2014/main" val="761235024"/>
                     </a:ext>
                   </a:extLst>
                 </a:gridCol>
                 <a:gridCol w="554182">
                   <a:extLst>
                     <a:ext uri="{9D8B030D-6E8A-4147-A177-3AD203B41FA5}">
-                      <a16:colId xmlns:a16="http://schemas.microsoft.com/office/drawing/2014/main" xmlns="" val="1110123748"/>
+                      <a16:colId xmlns="" xmlns:a16="http://schemas.microsoft.com/office/drawing/2014/main" val="1110123748"/>
                     </a:ext>
                   </a:extLst>
                 </a:gridCol>
                 <a:gridCol w="554182">
                   <a:extLst>
                     <a:ext uri="{9D8B030D-6E8A-4147-A177-3AD203B41FA5}">
-                      <a16:colId xmlns:a16="http://schemas.microsoft.com/office/drawing/2014/main" xmlns="" val="221974964"/>
+                      <a16:colId xmlns="" xmlns:a16="http://schemas.microsoft.com/office/drawing/2014/main" val="221974964"/>
                     </a:ext>
                   </a:extLst>
                 </a:gridCol>
                 <a:gridCol w="554182">
                   <a:extLst>
                     <a:ext uri="{9D8B030D-6E8A-4147-A177-3AD203B41FA5}">
-                      <a16:colId xmlns:a16="http://schemas.microsoft.com/office/drawing/2014/main" xmlns="" val="3520607064"/>
+                      <a16:colId xmlns="" xmlns:a16="http://schemas.microsoft.com/office/drawing/2014/main" val="3520607064"/>
                     </a:ext>
                   </a:extLst>
                 </a:gridCol>
                 <a:gridCol w="554182">
                   <a:extLst>
                     <a:ext uri="{9D8B030D-6E8A-4147-A177-3AD203B41FA5}">
-                      <a16:colId xmlns:a16="http://schemas.microsoft.com/office/drawing/2014/main" xmlns="" val="1351787277"/>
+                      <a16:colId xmlns="" xmlns:a16="http://schemas.microsoft.com/office/drawing/2014/main" val="1351787277"/>
                     </a:ext>
                   </a:extLst>
                 </a:gridCol>
                 <a:gridCol w="554182">
                   <a:extLst>
                     <a:ext uri="{9D8B030D-6E8A-4147-A177-3AD203B41FA5}">
-                      <a16:colId xmlns:a16="http://schemas.microsoft.com/office/drawing/2014/main" xmlns="" val="38250742"/>
+                      <a16:colId xmlns="" xmlns:a16="http://schemas.microsoft.com/office/drawing/2014/main" val="38250742"/>
                     </a:ext>
                   </a:extLst>
                 </a:gridCol>
@@ -10745,7 +10769,7 @@
                 </a:tc>
                 <a:extLst>
                   <a:ext uri="{0D108BD9-81ED-4DB2-BD59-A6C34878D82A}">
-                    <a16:rowId xmlns:a16="http://schemas.microsoft.com/office/drawing/2014/main" xmlns="" val="678417851"/>
+                    <a16:rowId xmlns="" xmlns:a16="http://schemas.microsoft.com/office/drawing/2014/main" val="678417851"/>
                   </a:ext>
                 </a:extLst>
               </a:tr>
@@ -10758,7 +10782,7 @@
           <p:cNvPr id="13" name="Table 9">
             <a:extLst>
               <a:ext uri="{FF2B5EF4-FFF2-40B4-BE49-F238E27FC236}">
-                <a16:creationId xmlns:a16="http://schemas.microsoft.com/office/drawing/2014/main" xmlns="" id="{AC780181-646D-48CB-A2CA-2C1256E8ADEB}"/>
+                <a16:creationId xmlns="" xmlns:a16="http://schemas.microsoft.com/office/drawing/2014/main" id="{AC780181-646D-48CB-A2CA-2C1256E8ADEB}"/>
               </a:ext>
             </a:extLst>
           </p:cNvPr>
@@ -10787,77 +10811,77 @@
                 <a:gridCol w="554182">
                   <a:extLst>
                     <a:ext uri="{9D8B030D-6E8A-4147-A177-3AD203B41FA5}">
-                      <a16:colId xmlns:a16="http://schemas.microsoft.com/office/drawing/2014/main" xmlns="" val="744068991"/>
+                      <a16:colId xmlns="" xmlns:a16="http://schemas.microsoft.com/office/drawing/2014/main" val="744068991"/>
                     </a:ext>
                   </a:extLst>
                 </a:gridCol>
                 <a:gridCol w="554182">
                   <a:extLst>
                     <a:ext uri="{9D8B030D-6E8A-4147-A177-3AD203B41FA5}">
-                      <a16:colId xmlns:a16="http://schemas.microsoft.com/office/drawing/2014/main" xmlns="" val="3308526507"/>
+                      <a16:colId xmlns="" xmlns:a16="http://schemas.microsoft.com/office/drawing/2014/main" val="3308526507"/>
                     </a:ext>
                   </a:extLst>
                 </a:gridCol>
                 <a:gridCol w="554182">
                   <a:extLst>
                     <a:ext uri="{9D8B030D-6E8A-4147-A177-3AD203B41FA5}">
-                      <a16:colId xmlns:a16="http://schemas.microsoft.com/office/drawing/2014/main" xmlns="" val="1286620001"/>
+                      <a16:colId xmlns="" xmlns:a16="http://schemas.microsoft.com/office/drawing/2014/main" val="1286620001"/>
                     </a:ext>
                   </a:extLst>
                 </a:gridCol>
                 <a:gridCol w="554182">
                   <a:extLst>
                     <a:ext uri="{9D8B030D-6E8A-4147-A177-3AD203B41FA5}">
-                      <a16:colId xmlns:a16="http://schemas.microsoft.com/office/drawing/2014/main" xmlns="" val="4003635970"/>
+                      <a16:colId xmlns="" xmlns:a16="http://schemas.microsoft.com/office/drawing/2014/main" val="4003635970"/>
                     </a:ext>
                   </a:extLst>
                 </a:gridCol>
                 <a:gridCol w="554182">
                   <a:extLst>
                     <a:ext uri="{9D8B030D-6E8A-4147-A177-3AD203B41FA5}">
-                      <a16:colId xmlns:a16="http://schemas.microsoft.com/office/drawing/2014/main" xmlns="" val="3440982615"/>
+                      <a16:colId xmlns="" xmlns:a16="http://schemas.microsoft.com/office/drawing/2014/main" val="3440982615"/>
                     </a:ext>
                   </a:extLst>
                 </a:gridCol>
                 <a:gridCol w="554182">
                   <a:extLst>
                     <a:ext uri="{9D8B030D-6E8A-4147-A177-3AD203B41FA5}">
-                      <a16:colId xmlns:a16="http://schemas.microsoft.com/office/drawing/2014/main" xmlns="" val="761235024"/>
+                      <a16:colId xmlns="" xmlns:a16="http://schemas.microsoft.com/office/drawing/2014/main" val="761235024"/>
                     </a:ext>
                   </a:extLst>
                 </a:gridCol>
                 <a:gridCol w="554182">
                   <a:extLst>
                     <a:ext uri="{9D8B030D-6E8A-4147-A177-3AD203B41FA5}">
-                      <a16:colId xmlns:a16="http://schemas.microsoft.com/office/drawing/2014/main" xmlns="" val="1110123748"/>
+                      <a16:colId xmlns="" xmlns:a16="http://schemas.microsoft.com/office/drawing/2014/main" val="1110123748"/>
                     </a:ext>
                   </a:extLst>
                 </a:gridCol>
                 <a:gridCol w="554182">
                   <a:extLst>
                     <a:ext uri="{9D8B030D-6E8A-4147-A177-3AD203B41FA5}">
-                      <a16:colId xmlns:a16="http://schemas.microsoft.com/office/drawing/2014/main" xmlns="" val="221974964"/>
+                      <a16:colId xmlns="" xmlns:a16="http://schemas.microsoft.com/office/drawing/2014/main" val="221974964"/>
                     </a:ext>
                   </a:extLst>
                 </a:gridCol>
                 <a:gridCol w="554182">
                   <a:extLst>
                     <a:ext uri="{9D8B030D-6E8A-4147-A177-3AD203B41FA5}">
-                      <a16:colId xmlns:a16="http://schemas.microsoft.com/office/drawing/2014/main" xmlns="" val="3520607064"/>
+                      <a16:colId xmlns="" xmlns:a16="http://schemas.microsoft.com/office/drawing/2014/main" val="3520607064"/>
                     </a:ext>
                   </a:extLst>
                 </a:gridCol>
                 <a:gridCol w="554182">
                   <a:extLst>
                     <a:ext uri="{9D8B030D-6E8A-4147-A177-3AD203B41FA5}">
-                      <a16:colId xmlns:a16="http://schemas.microsoft.com/office/drawing/2014/main" xmlns="" val="1351787277"/>
+                      <a16:colId xmlns="" xmlns:a16="http://schemas.microsoft.com/office/drawing/2014/main" val="1351787277"/>
                     </a:ext>
                   </a:extLst>
                 </a:gridCol>
                 <a:gridCol w="554182">
                   <a:extLst>
                     <a:ext uri="{9D8B030D-6E8A-4147-A177-3AD203B41FA5}">
-                      <a16:colId xmlns:a16="http://schemas.microsoft.com/office/drawing/2014/main" xmlns="" val="38250742"/>
+                      <a16:colId xmlns="" xmlns:a16="http://schemas.microsoft.com/office/drawing/2014/main" val="38250742"/>
                     </a:ext>
                   </a:extLst>
                 </a:gridCol>
@@ -11481,7 +11505,7 @@
                 </a:tc>
                 <a:extLst>
                   <a:ext uri="{0D108BD9-81ED-4DB2-BD59-A6C34878D82A}">
-                    <a16:rowId xmlns:a16="http://schemas.microsoft.com/office/drawing/2014/main" xmlns="" val="678417851"/>
+                    <a16:rowId xmlns="" xmlns:a16="http://schemas.microsoft.com/office/drawing/2014/main" val="678417851"/>
                   </a:ext>
                 </a:extLst>
               </a:tr>
@@ -11494,7 +11518,7 @@
           <p:cNvPr id="16" name="TextBox 15">
             <a:extLst>
               <a:ext uri="{FF2B5EF4-FFF2-40B4-BE49-F238E27FC236}">
-                <a16:creationId xmlns:a16="http://schemas.microsoft.com/office/drawing/2014/main" xmlns="" id="{716C0B65-7251-41E3-8CEC-F223038808B4}"/>
+                <a16:creationId xmlns="" xmlns:a16="http://schemas.microsoft.com/office/drawing/2014/main" id="{716C0B65-7251-41E3-8CEC-F223038808B4}"/>
               </a:ext>
             </a:extLst>
           </p:cNvPr>
@@ -11711,7 +11735,7 @@
           <p:cNvPr id="4" name="Picture 3">
             <a:extLst>
               <a:ext uri="{FF2B5EF4-FFF2-40B4-BE49-F238E27FC236}">
-                <a16:creationId xmlns:a16="http://schemas.microsoft.com/office/drawing/2014/main" xmlns="" id="{4CFA6950-C187-4898-ADBE-3B22D72B913A}"/>
+                <a16:creationId xmlns="" xmlns:a16="http://schemas.microsoft.com/office/drawing/2014/main" id="{4CFA6950-C187-4898-ADBE-3B22D72B913A}"/>
               </a:ext>
             </a:extLst>
           </p:cNvPr>
@@ -11741,7 +11765,7 @@
           <p:cNvPr id="6" name="TextBox 5">
             <a:extLst>
               <a:ext uri="{FF2B5EF4-FFF2-40B4-BE49-F238E27FC236}">
-                <a16:creationId xmlns:a16="http://schemas.microsoft.com/office/drawing/2014/main" xmlns="" id="{402A3897-B054-402E-9F89-72042BFA19C0}"/>
+                <a16:creationId xmlns="" xmlns:a16="http://schemas.microsoft.com/office/drawing/2014/main" id="{402A3897-B054-402E-9F89-72042BFA19C0}"/>
               </a:ext>
             </a:extLst>
           </p:cNvPr>
@@ -11776,7 +11800,7 @@
           <p:cNvPr id="7" name="TextBox 6">
             <a:extLst>
               <a:ext uri="{FF2B5EF4-FFF2-40B4-BE49-F238E27FC236}">
-                <a16:creationId xmlns:a16="http://schemas.microsoft.com/office/drawing/2014/main" xmlns="" id="{155EC00C-9FD5-42FA-BFC1-9E29DDACE9D7}"/>
+                <a16:creationId xmlns="" xmlns:a16="http://schemas.microsoft.com/office/drawing/2014/main" id="{155EC00C-9FD5-42FA-BFC1-9E29DDACE9D7}"/>
               </a:ext>
             </a:extLst>
           </p:cNvPr>
@@ -11811,7 +11835,7 @@
           <p:cNvPr id="10" name="TextBox 9">
             <a:extLst>
               <a:ext uri="{FF2B5EF4-FFF2-40B4-BE49-F238E27FC236}">
-                <a16:creationId xmlns:a16="http://schemas.microsoft.com/office/drawing/2014/main" xmlns="" id="{3DA9BF2B-4AA1-4789-BC49-0B5225E3496A}"/>
+                <a16:creationId xmlns="" xmlns:a16="http://schemas.microsoft.com/office/drawing/2014/main" id="{3DA9BF2B-4AA1-4789-BC49-0B5225E3496A}"/>
               </a:ext>
             </a:extLst>
           </p:cNvPr>
@@ -11915,7 +11939,7 @@
           <p:cNvPr id="2" name="Picture 1">
             <a:extLst>
               <a:ext uri="{FF2B5EF4-FFF2-40B4-BE49-F238E27FC236}">
-                <a16:creationId xmlns:a16="http://schemas.microsoft.com/office/drawing/2014/main" xmlns="" id="{7ECB4030-A586-4CBE-9D18-8A51C24610C5}"/>
+                <a16:creationId xmlns="" xmlns:a16="http://schemas.microsoft.com/office/drawing/2014/main" id="{7ECB4030-A586-4CBE-9D18-8A51C24610C5}"/>
               </a:ext>
             </a:extLst>
           </p:cNvPr>
@@ -11945,7 +11969,7 @@
           <p:cNvPr id="3" name="Rectangle 2">
             <a:extLst>
               <a:ext uri="{FF2B5EF4-FFF2-40B4-BE49-F238E27FC236}">
-                <a16:creationId xmlns:a16="http://schemas.microsoft.com/office/drawing/2014/main" xmlns="" id="{2BC41A95-1219-4BB6-A915-ED8186C5A3C6}"/>
+                <a16:creationId xmlns="" xmlns:a16="http://schemas.microsoft.com/office/drawing/2014/main" id="{2BC41A95-1219-4BB6-A915-ED8186C5A3C6}"/>
               </a:ext>
             </a:extLst>
           </p:cNvPr>
@@ -11997,7 +12021,7 @@
           <p:cNvPr id="17" name="Straight Arrow Connector 16">
             <a:extLst>
               <a:ext uri="{FF2B5EF4-FFF2-40B4-BE49-F238E27FC236}">
-                <a16:creationId xmlns:a16="http://schemas.microsoft.com/office/drawing/2014/main" xmlns="" id="{29D359BB-7C86-4F82-8DC5-7D1F9C1BEAB0}"/>
+                <a16:creationId xmlns="" xmlns:a16="http://schemas.microsoft.com/office/drawing/2014/main" id="{29D359BB-7C86-4F82-8DC5-7D1F9C1BEAB0}"/>
               </a:ext>
             </a:extLst>
           </p:cNvPr>
@@ -12041,7 +12065,7 @@
           <p:cNvPr id="19" name="TextBox 18">
             <a:extLst>
               <a:ext uri="{FF2B5EF4-FFF2-40B4-BE49-F238E27FC236}">
-                <a16:creationId xmlns:a16="http://schemas.microsoft.com/office/drawing/2014/main" xmlns="" id="{9735387B-F7BD-4C15-85D9-E47CFA06AAF3}"/>
+                <a16:creationId xmlns="" xmlns:a16="http://schemas.microsoft.com/office/drawing/2014/main" id="{9735387B-F7BD-4C15-85D9-E47CFA06AAF3}"/>
               </a:ext>
             </a:extLst>
           </p:cNvPr>
@@ -12076,7 +12100,7 @@
           <p:cNvPr id="20" name="Rectangle 19">
             <a:extLst>
               <a:ext uri="{FF2B5EF4-FFF2-40B4-BE49-F238E27FC236}">
-                <a16:creationId xmlns:a16="http://schemas.microsoft.com/office/drawing/2014/main" xmlns="" id="{F1511BA4-1C29-4919-A57B-FE6405B622F3}"/>
+                <a16:creationId xmlns="" xmlns:a16="http://schemas.microsoft.com/office/drawing/2014/main" id="{F1511BA4-1C29-4919-A57B-FE6405B622F3}"/>
               </a:ext>
             </a:extLst>
           </p:cNvPr>
@@ -12128,7 +12152,7 @@
           <p:cNvPr id="21" name="Straight Arrow Connector 20">
             <a:extLst>
               <a:ext uri="{FF2B5EF4-FFF2-40B4-BE49-F238E27FC236}">
-                <a16:creationId xmlns:a16="http://schemas.microsoft.com/office/drawing/2014/main" xmlns="" id="{58068C50-3DB6-42FB-82F3-627B8C37E755}"/>
+                <a16:creationId xmlns="" xmlns:a16="http://schemas.microsoft.com/office/drawing/2014/main" id="{58068C50-3DB6-42FB-82F3-627B8C37E755}"/>
               </a:ext>
             </a:extLst>
           </p:cNvPr>
@@ -12172,7 +12196,7 @@
           <p:cNvPr id="23" name="TextBox 22">
             <a:extLst>
               <a:ext uri="{FF2B5EF4-FFF2-40B4-BE49-F238E27FC236}">
-                <a16:creationId xmlns:a16="http://schemas.microsoft.com/office/drawing/2014/main" xmlns="" id="{06E685D9-2FF3-4583-9924-0779DB2B878D}"/>
+                <a16:creationId xmlns="" xmlns:a16="http://schemas.microsoft.com/office/drawing/2014/main" id="{06E685D9-2FF3-4583-9924-0779DB2B878D}"/>
               </a:ext>
             </a:extLst>
           </p:cNvPr>
@@ -12207,7 +12231,7 @@
           <p:cNvPr id="4" name="TextBox 3">
             <a:extLst>
               <a:ext uri="{FF2B5EF4-FFF2-40B4-BE49-F238E27FC236}">
-                <a16:creationId xmlns:a16="http://schemas.microsoft.com/office/drawing/2014/main" xmlns="" id="{A73137C3-D82F-4A2D-BB46-6ED600B90057}"/>
+                <a16:creationId xmlns="" xmlns:a16="http://schemas.microsoft.com/office/drawing/2014/main" id="{A73137C3-D82F-4A2D-BB46-6ED600B90057}"/>
               </a:ext>
             </a:extLst>
           </p:cNvPr>
@@ -12309,7 +12333,7 @@
           <p:cNvPr id="13" name="TextBox 12">
             <a:extLst>
               <a:ext uri="{FF2B5EF4-FFF2-40B4-BE49-F238E27FC236}">
-                <a16:creationId xmlns:a16="http://schemas.microsoft.com/office/drawing/2014/main" xmlns="" id="{CE9D1E19-032E-4AB6-BF28-FC8EC16D5D4C}"/>
+                <a16:creationId xmlns="" xmlns:a16="http://schemas.microsoft.com/office/drawing/2014/main" id="{CE9D1E19-032E-4AB6-BF28-FC8EC16D5D4C}"/>
               </a:ext>
             </a:extLst>
           </p:cNvPr>
@@ -12424,7 +12448,7 @@
           <p:cNvPr id="14" name="TextBox 13">
             <a:extLst>
               <a:ext uri="{FF2B5EF4-FFF2-40B4-BE49-F238E27FC236}">
-                <a16:creationId xmlns:a16="http://schemas.microsoft.com/office/drawing/2014/main" xmlns="" id="{44506001-D35E-4CF1-99E7-7A619A4D856E}"/>
+                <a16:creationId xmlns="" xmlns:a16="http://schemas.microsoft.com/office/drawing/2014/main" id="{44506001-D35E-4CF1-99E7-7A619A4D856E}"/>
               </a:ext>
             </a:extLst>
           </p:cNvPr>
@@ -12463,7 +12487,7 @@
           <p:cNvPr id="15" name="TextBox 14">
             <a:extLst>
               <a:ext uri="{FF2B5EF4-FFF2-40B4-BE49-F238E27FC236}">
-                <a16:creationId xmlns:a16="http://schemas.microsoft.com/office/drawing/2014/main" xmlns="" id="{0037177C-A9D9-4728-89DA-9D3981E0DC71}"/>
+                <a16:creationId xmlns="" xmlns:a16="http://schemas.microsoft.com/office/drawing/2014/main" id="{0037177C-A9D9-4728-89DA-9D3981E0DC71}"/>
               </a:ext>
             </a:extLst>
           </p:cNvPr>
@@ -12502,7 +12526,7 @@
           <p:cNvPr id="16" name="TextBox 15">
             <a:extLst>
               <a:ext uri="{FF2B5EF4-FFF2-40B4-BE49-F238E27FC236}">
-                <a16:creationId xmlns:a16="http://schemas.microsoft.com/office/drawing/2014/main" xmlns="" id="{EB48ECE0-6FC5-4094-9054-C03255E55C1D}"/>
+                <a16:creationId xmlns="" xmlns:a16="http://schemas.microsoft.com/office/drawing/2014/main" id="{EB48ECE0-6FC5-4094-9054-C03255E55C1D}"/>
               </a:ext>
             </a:extLst>
           </p:cNvPr>
@@ -12588,7 +12612,7 @@
           <p:cNvPr id="11" name="TextBox 10">
             <a:extLst>
               <a:ext uri="{FF2B5EF4-FFF2-40B4-BE49-F238E27FC236}">
-                <a16:creationId xmlns:a16="http://schemas.microsoft.com/office/drawing/2014/main" xmlns="" id="{EABA38DD-3BDD-4C4E-A19E-1FC23A7B9798}"/>
+                <a16:creationId xmlns="" xmlns:a16="http://schemas.microsoft.com/office/drawing/2014/main" id="{EABA38DD-3BDD-4C4E-A19E-1FC23A7B9798}"/>
               </a:ext>
             </a:extLst>
           </p:cNvPr>
@@ -12626,7 +12650,7 @@
           <p:cNvPr id="12" name="Table 9">
             <a:extLst>
               <a:ext uri="{FF2B5EF4-FFF2-40B4-BE49-F238E27FC236}">
-                <a16:creationId xmlns:a16="http://schemas.microsoft.com/office/drawing/2014/main" xmlns="" id="{2BA16D09-EA84-4361-8585-7FB471A22F4A}"/>
+                <a16:creationId xmlns="" xmlns:a16="http://schemas.microsoft.com/office/drawing/2014/main" id="{2BA16D09-EA84-4361-8585-7FB471A22F4A}"/>
               </a:ext>
             </a:extLst>
           </p:cNvPr>
@@ -12655,91 +12679,91 @@
                 <a:gridCol w="511527">
                   <a:extLst>
                     <a:ext uri="{9D8B030D-6E8A-4147-A177-3AD203B41FA5}">
-                      <a16:colId xmlns:a16="http://schemas.microsoft.com/office/drawing/2014/main" xmlns="" val="744068991"/>
+                      <a16:colId xmlns="" xmlns:a16="http://schemas.microsoft.com/office/drawing/2014/main" val="744068991"/>
                     </a:ext>
                   </a:extLst>
                 </a:gridCol>
                 <a:gridCol w="511527">
                   <a:extLst>
                     <a:ext uri="{9D8B030D-6E8A-4147-A177-3AD203B41FA5}">
-                      <a16:colId xmlns:a16="http://schemas.microsoft.com/office/drawing/2014/main" xmlns="" val="3308526507"/>
+                      <a16:colId xmlns="" xmlns:a16="http://schemas.microsoft.com/office/drawing/2014/main" val="3308526507"/>
                     </a:ext>
                   </a:extLst>
                 </a:gridCol>
                 <a:gridCol w="511527">
                   <a:extLst>
                     <a:ext uri="{9D8B030D-6E8A-4147-A177-3AD203B41FA5}">
-                      <a16:colId xmlns:a16="http://schemas.microsoft.com/office/drawing/2014/main" xmlns="" val="1286620001"/>
+                      <a16:colId xmlns="" xmlns:a16="http://schemas.microsoft.com/office/drawing/2014/main" val="1286620001"/>
                     </a:ext>
                   </a:extLst>
                 </a:gridCol>
                 <a:gridCol w="511527">
                   <a:extLst>
                     <a:ext uri="{9D8B030D-6E8A-4147-A177-3AD203B41FA5}">
-                      <a16:colId xmlns:a16="http://schemas.microsoft.com/office/drawing/2014/main" xmlns="" val="4003635970"/>
+                      <a16:colId xmlns="" xmlns:a16="http://schemas.microsoft.com/office/drawing/2014/main" val="4003635970"/>
                     </a:ext>
                   </a:extLst>
                 </a:gridCol>
                 <a:gridCol w="511527">
                   <a:extLst>
                     <a:ext uri="{9D8B030D-6E8A-4147-A177-3AD203B41FA5}">
-                      <a16:colId xmlns:a16="http://schemas.microsoft.com/office/drawing/2014/main" xmlns="" val="3440982615"/>
+                      <a16:colId xmlns="" xmlns:a16="http://schemas.microsoft.com/office/drawing/2014/main" val="3440982615"/>
                     </a:ext>
                   </a:extLst>
                 </a:gridCol>
                 <a:gridCol w="511527">
                   <a:extLst>
                     <a:ext uri="{9D8B030D-6E8A-4147-A177-3AD203B41FA5}">
-                      <a16:colId xmlns:a16="http://schemas.microsoft.com/office/drawing/2014/main" xmlns="" val="761235024"/>
+                      <a16:colId xmlns="" xmlns:a16="http://schemas.microsoft.com/office/drawing/2014/main" val="761235024"/>
                     </a:ext>
                   </a:extLst>
                 </a:gridCol>
                 <a:gridCol w="511527">
                   <a:extLst>
                     <a:ext uri="{9D8B030D-6E8A-4147-A177-3AD203B41FA5}">
-                      <a16:colId xmlns:a16="http://schemas.microsoft.com/office/drawing/2014/main" xmlns="" val="1110123748"/>
+                      <a16:colId xmlns="" xmlns:a16="http://schemas.microsoft.com/office/drawing/2014/main" val="1110123748"/>
                     </a:ext>
                   </a:extLst>
                 </a:gridCol>
                 <a:gridCol w="511527">
                   <a:extLst>
                     <a:ext uri="{9D8B030D-6E8A-4147-A177-3AD203B41FA5}">
-                      <a16:colId xmlns:a16="http://schemas.microsoft.com/office/drawing/2014/main" xmlns="" val="221974964"/>
+                      <a16:colId xmlns="" xmlns:a16="http://schemas.microsoft.com/office/drawing/2014/main" val="221974964"/>
                     </a:ext>
                   </a:extLst>
                 </a:gridCol>
                 <a:gridCol w="511527">
                   <a:extLst>
                     <a:ext uri="{9D8B030D-6E8A-4147-A177-3AD203B41FA5}">
-                      <a16:colId xmlns:a16="http://schemas.microsoft.com/office/drawing/2014/main" xmlns="" val="3520607064"/>
+                      <a16:colId xmlns="" xmlns:a16="http://schemas.microsoft.com/office/drawing/2014/main" val="3520607064"/>
                     </a:ext>
                   </a:extLst>
                 </a:gridCol>
                 <a:gridCol w="511527">
                   <a:extLst>
                     <a:ext uri="{9D8B030D-6E8A-4147-A177-3AD203B41FA5}">
-                      <a16:colId xmlns:a16="http://schemas.microsoft.com/office/drawing/2014/main" xmlns="" val="1351787277"/>
+                      <a16:colId xmlns="" xmlns:a16="http://schemas.microsoft.com/office/drawing/2014/main" val="1351787277"/>
                     </a:ext>
                   </a:extLst>
                 </a:gridCol>
                 <a:gridCol w="511527">
                   <a:extLst>
                     <a:ext uri="{9D8B030D-6E8A-4147-A177-3AD203B41FA5}">
-                      <a16:colId xmlns:a16="http://schemas.microsoft.com/office/drawing/2014/main" xmlns="" val="38250742"/>
+                      <a16:colId xmlns="" xmlns:a16="http://schemas.microsoft.com/office/drawing/2014/main" val="38250742"/>
                     </a:ext>
                   </a:extLst>
                 </a:gridCol>
                 <a:gridCol w="511527">
                   <a:extLst>
                     <a:ext uri="{9D8B030D-6E8A-4147-A177-3AD203B41FA5}">
-                      <a16:colId xmlns:a16="http://schemas.microsoft.com/office/drawing/2014/main" xmlns="" val="1799399564"/>
+                      <a16:colId xmlns="" xmlns:a16="http://schemas.microsoft.com/office/drawing/2014/main" val="1799399564"/>
                     </a:ext>
                   </a:extLst>
                 </a:gridCol>
                 <a:gridCol w="511527">
                   <a:extLst>
                     <a:ext uri="{9D8B030D-6E8A-4147-A177-3AD203B41FA5}">
-                      <a16:colId xmlns:a16="http://schemas.microsoft.com/office/drawing/2014/main" xmlns="" val="4217050998"/>
+                      <a16:colId xmlns="" xmlns:a16="http://schemas.microsoft.com/office/drawing/2014/main" val="4217050998"/>
                     </a:ext>
                   </a:extLst>
                 </a:gridCol>
@@ -13540,7 +13564,7 @@
                 </a:tc>
                 <a:extLst>
                   <a:ext uri="{0D108BD9-81ED-4DB2-BD59-A6C34878D82A}">
-                    <a16:rowId xmlns:a16="http://schemas.microsoft.com/office/drawing/2014/main" xmlns="" val="678417851"/>
+                    <a16:rowId xmlns="" xmlns:a16="http://schemas.microsoft.com/office/drawing/2014/main" val="678417851"/>
                   </a:ext>
                 </a:extLst>
               </a:tr>
@@ -13553,7 +13577,7 @@
           <p:cNvPr id="14" name="Table 9">
             <a:extLst>
               <a:ext uri="{FF2B5EF4-FFF2-40B4-BE49-F238E27FC236}">
-                <a16:creationId xmlns:a16="http://schemas.microsoft.com/office/drawing/2014/main" xmlns="" id="{AD477144-550E-4247-B373-42EC6F56B233}"/>
+                <a16:creationId xmlns="" xmlns:a16="http://schemas.microsoft.com/office/drawing/2014/main" id="{AD477144-550E-4247-B373-42EC6F56B233}"/>
               </a:ext>
             </a:extLst>
           </p:cNvPr>
@@ -13582,91 +13606,91 @@
                 <a:gridCol w="511527">
                   <a:extLst>
                     <a:ext uri="{9D8B030D-6E8A-4147-A177-3AD203B41FA5}">
-                      <a16:colId xmlns:a16="http://schemas.microsoft.com/office/drawing/2014/main" xmlns="" val="744068991"/>
+                      <a16:colId xmlns="" xmlns:a16="http://schemas.microsoft.com/office/drawing/2014/main" val="744068991"/>
                     </a:ext>
                   </a:extLst>
                 </a:gridCol>
                 <a:gridCol w="511527">
                   <a:extLst>
                     <a:ext uri="{9D8B030D-6E8A-4147-A177-3AD203B41FA5}">
-                      <a16:colId xmlns:a16="http://schemas.microsoft.com/office/drawing/2014/main" xmlns="" val="3308526507"/>
+                      <a16:colId xmlns="" xmlns:a16="http://schemas.microsoft.com/office/drawing/2014/main" val="3308526507"/>
                     </a:ext>
                   </a:extLst>
                 </a:gridCol>
                 <a:gridCol w="511527">
                   <a:extLst>
                     <a:ext uri="{9D8B030D-6E8A-4147-A177-3AD203B41FA5}">
-                      <a16:colId xmlns:a16="http://schemas.microsoft.com/office/drawing/2014/main" xmlns="" val="1286620001"/>
+                      <a16:colId xmlns="" xmlns:a16="http://schemas.microsoft.com/office/drawing/2014/main" val="1286620001"/>
                     </a:ext>
                   </a:extLst>
                 </a:gridCol>
                 <a:gridCol w="511527">
                   <a:extLst>
                     <a:ext uri="{9D8B030D-6E8A-4147-A177-3AD203B41FA5}">
-                      <a16:colId xmlns:a16="http://schemas.microsoft.com/office/drawing/2014/main" xmlns="" val="4003635970"/>
+                      <a16:colId xmlns="" xmlns:a16="http://schemas.microsoft.com/office/drawing/2014/main" val="4003635970"/>
                     </a:ext>
                   </a:extLst>
                 </a:gridCol>
                 <a:gridCol w="511527">
                   <a:extLst>
                     <a:ext uri="{9D8B030D-6E8A-4147-A177-3AD203B41FA5}">
-                      <a16:colId xmlns:a16="http://schemas.microsoft.com/office/drawing/2014/main" xmlns="" val="3440982615"/>
+                      <a16:colId xmlns="" xmlns:a16="http://schemas.microsoft.com/office/drawing/2014/main" val="3440982615"/>
                     </a:ext>
                   </a:extLst>
                 </a:gridCol>
                 <a:gridCol w="511527">
                   <a:extLst>
                     <a:ext uri="{9D8B030D-6E8A-4147-A177-3AD203B41FA5}">
-                      <a16:colId xmlns:a16="http://schemas.microsoft.com/office/drawing/2014/main" xmlns="" val="761235024"/>
+                      <a16:colId xmlns="" xmlns:a16="http://schemas.microsoft.com/office/drawing/2014/main" val="761235024"/>
                     </a:ext>
                   </a:extLst>
                 </a:gridCol>
                 <a:gridCol w="511527">
                   <a:extLst>
                     <a:ext uri="{9D8B030D-6E8A-4147-A177-3AD203B41FA5}">
-                      <a16:colId xmlns:a16="http://schemas.microsoft.com/office/drawing/2014/main" xmlns="" val="1110123748"/>
+                      <a16:colId xmlns="" xmlns:a16="http://schemas.microsoft.com/office/drawing/2014/main" val="1110123748"/>
                     </a:ext>
                   </a:extLst>
                 </a:gridCol>
                 <a:gridCol w="511527">
                   <a:extLst>
                     <a:ext uri="{9D8B030D-6E8A-4147-A177-3AD203B41FA5}">
-                      <a16:colId xmlns:a16="http://schemas.microsoft.com/office/drawing/2014/main" xmlns="" val="221974964"/>
+                      <a16:colId xmlns="" xmlns:a16="http://schemas.microsoft.com/office/drawing/2014/main" val="221974964"/>
                     </a:ext>
                   </a:extLst>
                 </a:gridCol>
                 <a:gridCol w="511527">
                   <a:extLst>
                     <a:ext uri="{9D8B030D-6E8A-4147-A177-3AD203B41FA5}">
-                      <a16:colId xmlns:a16="http://schemas.microsoft.com/office/drawing/2014/main" xmlns="" val="3520607064"/>
+                      <a16:colId xmlns="" xmlns:a16="http://schemas.microsoft.com/office/drawing/2014/main" val="3520607064"/>
                     </a:ext>
                   </a:extLst>
                 </a:gridCol>
                 <a:gridCol w="511527">
                   <a:extLst>
                     <a:ext uri="{9D8B030D-6E8A-4147-A177-3AD203B41FA5}">
-                      <a16:colId xmlns:a16="http://schemas.microsoft.com/office/drawing/2014/main" xmlns="" val="1351787277"/>
+                      <a16:colId xmlns="" xmlns:a16="http://schemas.microsoft.com/office/drawing/2014/main" val="1351787277"/>
                     </a:ext>
                   </a:extLst>
                 </a:gridCol>
                 <a:gridCol w="511527">
                   <a:extLst>
                     <a:ext uri="{9D8B030D-6E8A-4147-A177-3AD203B41FA5}">
-                      <a16:colId xmlns:a16="http://schemas.microsoft.com/office/drawing/2014/main" xmlns="" val="38250742"/>
+                      <a16:colId xmlns="" xmlns:a16="http://schemas.microsoft.com/office/drawing/2014/main" val="38250742"/>
                     </a:ext>
                   </a:extLst>
                 </a:gridCol>
                 <a:gridCol w="511527">
                   <a:extLst>
                     <a:ext uri="{9D8B030D-6E8A-4147-A177-3AD203B41FA5}">
-                      <a16:colId xmlns:a16="http://schemas.microsoft.com/office/drawing/2014/main" xmlns="" val="1799399564"/>
+                      <a16:colId xmlns="" xmlns:a16="http://schemas.microsoft.com/office/drawing/2014/main" val="1799399564"/>
                     </a:ext>
                   </a:extLst>
                 </a:gridCol>
                 <a:gridCol w="511527">
                   <a:extLst>
                     <a:ext uri="{9D8B030D-6E8A-4147-A177-3AD203B41FA5}">
-                      <a16:colId xmlns:a16="http://schemas.microsoft.com/office/drawing/2014/main" xmlns="" val="4217050998"/>
+                      <a16:colId xmlns="" xmlns:a16="http://schemas.microsoft.com/office/drawing/2014/main" val="4217050998"/>
                     </a:ext>
                   </a:extLst>
                 </a:gridCol>
@@ -14402,7 +14426,7 @@
                 </a:tc>
                 <a:extLst>
                   <a:ext uri="{0D108BD9-81ED-4DB2-BD59-A6C34878D82A}">
-                    <a16:rowId xmlns:a16="http://schemas.microsoft.com/office/drawing/2014/main" xmlns="" val="678417851"/>
+                    <a16:rowId xmlns="" xmlns:a16="http://schemas.microsoft.com/office/drawing/2014/main" val="678417851"/>
                   </a:ext>
                 </a:extLst>
               </a:tr>
@@ -14415,7 +14439,7 @@
           <p:cNvPr id="4" name="TextBox 3">
             <a:extLst>
               <a:ext uri="{FF2B5EF4-FFF2-40B4-BE49-F238E27FC236}">
-                <a16:creationId xmlns:a16="http://schemas.microsoft.com/office/drawing/2014/main" xmlns="" id="{A474579B-8E3A-4F21-AA24-F7BFA4D05707}"/>
+                <a16:creationId xmlns="" xmlns:a16="http://schemas.microsoft.com/office/drawing/2014/main" id="{A474579B-8E3A-4F21-AA24-F7BFA4D05707}"/>
               </a:ext>
             </a:extLst>
           </p:cNvPr>
@@ -14450,7 +14474,7 @@
           <p:cNvPr id="6" name="TextBox 5">
             <a:extLst>
               <a:ext uri="{FF2B5EF4-FFF2-40B4-BE49-F238E27FC236}">
-                <a16:creationId xmlns:a16="http://schemas.microsoft.com/office/drawing/2014/main" xmlns="" id="{22DADF2F-D5C9-49BD-B7A2-4AB616DCABCF}"/>
+                <a16:creationId xmlns="" xmlns:a16="http://schemas.microsoft.com/office/drawing/2014/main" id="{22DADF2F-D5C9-49BD-B7A2-4AB616DCABCF}"/>
               </a:ext>
             </a:extLst>
           </p:cNvPr>
@@ -14504,7 +14528,7 @@
           <p:cNvPr id="18" name="TextBox 17">
             <a:extLst>
               <a:ext uri="{FF2B5EF4-FFF2-40B4-BE49-F238E27FC236}">
-                <a16:creationId xmlns:a16="http://schemas.microsoft.com/office/drawing/2014/main" xmlns="" id="{94E1B288-48F9-4FB6-B04F-79F10971F1AD}"/>
+                <a16:creationId xmlns="" xmlns:a16="http://schemas.microsoft.com/office/drawing/2014/main" id="{94E1B288-48F9-4FB6-B04F-79F10971F1AD}"/>
               </a:ext>
             </a:extLst>
           </p:cNvPr>
@@ -14735,7 +14759,7 @@
           <p:cNvPr id="11" name="TextBox 10">
             <a:extLst>
               <a:ext uri="{FF2B5EF4-FFF2-40B4-BE49-F238E27FC236}">
-                <a16:creationId xmlns:a16="http://schemas.microsoft.com/office/drawing/2014/main" xmlns="" id="{EABA38DD-3BDD-4C4E-A19E-1FC23A7B9798}"/>
+                <a16:creationId xmlns="" xmlns:a16="http://schemas.microsoft.com/office/drawing/2014/main" id="{EABA38DD-3BDD-4C4E-A19E-1FC23A7B9798}"/>
               </a:ext>
             </a:extLst>
           </p:cNvPr>
@@ -14773,7 +14797,7 @@
           <p:cNvPr id="10" name="Picture 9" descr="C:\Users\Karin\Google Drive\CS\CS1501\DoubleHashST.java - Notepad++">
             <a:extLst>
               <a:ext uri="{FF2B5EF4-FFF2-40B4-BE49-F238E27FC236}">
-                <a16:creationId xmlns:a16="http://schemas.microsoft.com/office/drawing/2014/main" xmlns="" id="{B722188F-061B-4D0E-BE8B-694D90C80D15}"/>
+                <a16:creationId xmlns="" xmlns:a16="http://schemas.microsoft.com/office/drawing/2014/main" id="{B722188F-061B-4D0E-BE8B-694D90C80D15}"/>
               </a:ext>
             </a:extLst>
           </p:cNvPr>
@@ -14808,7 +14832,7 @@
           <p:cNvPr id="13" name="TextBox 12">
             <a:extLst>
               <a:ext uri="{FF2B5EF4-FFF2-40B4-BE49-F238E27FC236}">
-                <a16:creationId xmlns:a16="http://schemas.microsoft.com/office/drawing/2014/main" xmlns="" id="{9D221932-FA0A-4E9F-8809-1558A9A80A29}"/>
+                <a16:creationId xmlns="" xmlns:a16="http://schemas.microsoft.com/office/drawing/2014/main" id="{9D221932-FA0A-4E9F-8809-1558A9A80A29}"/>
               </a:ext>
             </a:extLst>
           </p:cNvPr>

</xml_diff>